<commit_message>
added test image to README
</commit_message>
<xml_diff>
--- a/Slide Deck.pptx
+++ b/Slide Deck.pptx
@@ -118,2852 +118,6 @@
 </p:presentation>
 </file>
 
-<file path=ppt/diagrams/colors1.xml><?xml version="1.0" encoding="utf-8"?>
-<dgm:colorsDef xmlns:dgm="http://schemas.openxmlformats.org/drawingml/2006/diagram" xmlns:a="http://schemas.openxmlformats.org/drawingml/2006/main" uniqueId="urn:microsoft.com/office/officeart/2005/8/colors/accent1_2">
-  <dgm:title val=""/>
-  <dgm:desc val=""/>
-  <dgm:catLst>
-    <dgm:cat type="accent1" pri="11200"/>
-  </dgm:catLst>
-  <dgm:styleLbl name="node0">
-    <dgm:fillClrLst meth="repeat">
-      <a:schemeClr val="accent1"/>
-    </dgm:fillClrLst>
-    <dgm:linClrLst meth="repeat">
-      <a:schemeClr val="lt1"/>
-    </dgm:linClrLst>
-    <dgm:effectClrLst/>
-    <dgm:txLinClrLst/>
-    <dgm:txFillClrLst/>
-    <dgm:txEffectClrLst/>
-  </dgm:styleLbl>
-  <dgm:styleLbl name="alignNode1">
-    <dgm:fillClrLst meth="repeat">
-      <a:schemeClr val="accent1"/>
-    </dgm:fillClrLst>
-    <dgm:linClrLst meth="repeat">
-      <a:schemeClr val="accent1"/>
-    </dgm:linClrLst>
-    <dgm:effectClrLst/>
-    <dgm:txLinClrLst/>
-    <dgm:txFillClrLst/>
-    <dgm:txEffectClrLst/>
-  </dgm:styleLbl>
-  <dgm:styleLbl name="node1">
-    <dgm:fillClrLst meth="repeat">
-      <a:schemeClr val="accent1"/>
-    </dgm:fillClrLst>
-    <dgm:linClrLst meth="repeat">
-      <a:schemeClr val="lt1"/>
-    </dgm:linClrLst>
-    <dgm:effectClrLst/>
-    <dgm:txLinClrLst/>
-    <dgm:txFillClrLst/>
-    <dgm:txEffectClrLst/>
-  </dgm:styleLbl>
-  <dgm:styleLbl name="lnNode1">
-    <dgm:fillClrLst meth="repeat">
-      <a:schemeClr val="accent1"/>
-    </dgm:fillClrLst>
-    <dgm:linClrLst meth="repeat">
-      <a:schemeClr val="lt1"/>
-    </dgm:linClrLst>
-    <dgm:effectClrLst/>
-    <dgm:txLinClrLst/>
-    <dgm:txFillClrLst/>
-    <dgm:txEffectClrLst/>
-  </dgm:styleLbl>
-  <dgm:styleLbl name="vennNode1">
-    <dgm:fillClrLst meth="repeat">
-      <a:schemeClr val="accent1">
-        <a:alpha val="50000"/>
-      </a:schemeClr>
-    </dgm:fillClrLst>
-    <dgm:linClrLst meth="repeat">
-      <a:schemeClr val="lt1"/>
-    </dgm:linClrLst>
-    <dgm:effectClrLst/>
-    <dgm:txLinClrLst/>
-    <dgm:txFillClrLst/>
-    <dgm:txEffectClrLst/>
-  </dgm:styleLbl>
-  <dgm:styleLbl name="node2">
-    <dgm:fillClrLst meth="repeat">
-      <a:schemeClr val="accent1"/>
-    </dgm:fillClrLst>
-    <dgm:linClrLst meth="repeat">
-      <a:schemeClr val="lt1"/>
-    </dgm:linClrLst>
-    <dgm:effectClrLst/>
-    <dgm:txLinClrLst/>
-    <dgm:txFillClrLst/>
-    <dgm:txEffectClrLst/>
-  </dgm:styleLbl>
-  <dgm:styleLbl name="node3">
-    <dgm:fillClrLst meth="repeat">
-      <a:schemeClr val="accent1"/>
-    </dgm:fillClrLst>
-    <dgm:linClrLst meth="repeat">
-      <a:schemeClr val="lt1"/>
-    </dgm:linClrLst>
-    <dgm:effectClrLst/>
-    <dgm:txLinClrLst/>
-    <dgm:txFillClrLst/>
-    <dgm:txEffectClrLst/>
-  </dgm:styleLbl>
-  <dgm:styleLbl name="node4">
-    <dgm:fillClrLst meth="repeat">
-      <a:schemeClr val="accent1"/>
-    </dgm:fillClrLst>
-    <dgm:linClrLst meth="repeat">
-      <a:schemeClr val="lt1"/>
-    </dgm:linClrLst>
-    <dgm:effectClrLst/>
-    <dgm:txLinClrLst/>
-    <dgm:txFillClrLst/>
-    <dgm:txEffectClrLst/>
-  </dgm:styleLbl>
-  <dgm:styleLbl name="fgImgPlace1">
-    <dgm:fillClrLst meth="repeat">
-      <a:schemeClr val="accent1">
-        <a:tint val="50000"/>
-      </a:schemeClr>
-    </dgm:fillClrLst>
-    <dgm:linClrLst meth="repeat">
-      <a:schemeClr val="lt1"/>
-    </dgm:linClrLst>
-    <dgm:effectClrLst/>
-    <dgm:txLinClrLst/>
-    <dgm:txFillClrLst meth="repeat">
-      <a:schemeClr val="lt1"/>
-    </dgm:txFillClrLst>
-    <dgm:txEffectClrLst/>
-  </dgm:styleLbl>
-  <dgm:styleLbl name="alignImgPlace1">
-    <dgm:fillClrLst meth="repeat">
-      <a:schemeClr val="accent1">
-        <a:tint val="50000"/>
-      </a:schemeClr>
-    </dgm:fillClrLst>
-    <dgm:linClrLst meth="repeat">
-      <a:schemeClr val="lt1"/>
-    </dgm:linClrLst>
-    <dgm:effectClrLst/>
-    <dgm:txLinClrLst/>
-    <dgm:txFillClrLst meth="repeat">
-      <a:schemeClr val="lt1"/>
-    </dgm:txFillClrLst>
-    <dgm:txEffectClrLst/>
-  </dgm:styleLbl>
-  <dgm:styleLbl name="bgImgPlace1">
-    <dgm:fillClrLst meth="repeat">
-      <a:schemeClr val="accent1">
-        <a:tint val="50000"/>
-      </a:schemeClr>
-    </dgm:fillClrLst>
-    <dgm:linClrLst meth="repeat">
-      <a:schemeClr val="lt1"/>
-    </dgm:linClrLst>
-    <dgm:effectClrLst/>
-    <dgm:txLinClrLst/>
-    <dgm:txFillClrLst meth="repeat">
-      <a:schemeClr val="lt1"/>
-    </dgm:txFillClrLst>
-    <dgm:txEffectClrLst/>
-  </dgm:styleLbl>
-  <dgm:styleLbl name="sibTrans2D1">
-    <dgm:fillClrLst meth="repeat">
-      <a:schemeClr val="accent1">
-        <a:tint val="60000"/>
-      </a:schemeClr>
-    </dgm:fillClrLst>
-    <dgm:linClrLst meth="repeat">
-      <a:schemeClr val="accent1">
-        <a:tint val="60000"/>
-      </a:schemeClr>
-    </dgm:linClrLst>
-    <dgm:effectClrLst/>
-    <dgm:txLinClrLst/>
-    <dgm:txFillClrLst/>
-    <dgm:txEffectClrLst/>
-  </dgm:styleLbl>
-  <dgm:styleLbl name="fgSibTrans2D1">
-    <dgm:fillClrLst meth="repeat">
-      <a:schemeClr val="accent1">
-        <a:tint val="60000"/>
-      </a:schemeClr>
-    </dgm:fillClrLst>
-    <dgm:linClrLst meth="repeat">
-      <a:schemeClr val="accent1">
-        <a:tint val="60000"/>
-      </a:schemeClr>
-    </dgm:linClrLst>
-    <dgm:effectClrLst/>
-    <dgm:txLinClrLst/>
-    <dgm:txFillClrLst/>
-    <dgm:txEffectClrLst/>
-  </dgm:styleLbl>
-  <dgm:styleLbl name="bgSibTrans2D1">
-    <dgm:fillClrLst meth="repeat">
-      <a:schemeClr val="accent1">
-        <a:tint val="60000"/>
-      </a:schemeClr>
-    </dgm:fillClrLst>
-    <dgm:linClrLst meth="repeat">
-      <a:schemeClr val="accent1">
-        <a:tint val="60000"/>
-      </a:schemeClr>
-    </dgm:linClrLst>
-    <dgm:effectClrLst/>
-    <dgm:txLinClrLst/>
-    <dgm:txFillClrLst/>
-    <dgm:txEffectClrLst/>
-  </dgm:styleLbl>
-  <dgm:styleLbl name="sibTrans1D1">
-    <dgm:fillClrLst meth="repeat">
-      <a:schemeClr val="accent1"/>
-    </dgm:fillClrLst>
-    <dgm:linClrLst meth="repeat">
-      <a:schemeClr val="accent1"/>
-    </dgm:linClrLst>
-    <dgm:effectClrLst/>
-    <dgm:txLinClrLst/>
-    <dgm:txFillClrLst meth="repeat">
-      <a:schemeClr val="tx1"/>
-    </dgm:txFillClrLst>
-    <dgm:txEffectClrLst/>
-  </dgm:styleLbl>
-  <dgm:styleLbl name="callout">
-    <dgm:fillClrLst meth="repeat">
-      <a:schemeClr val="accent1"/>
-    </dgm:fillClrLst>
-    <dgm:linClrLst meth="repeat">
-      <a:schemeClr val="accent1">
-        <a:tint val="50000"/>
-      </a:schemeClr>
-    </dgm:linClrLst>
-    <dgm:effectClrLst/>
-    <dgm:txLinClrLst/>
-    <dgm:txFillClrLst meth="repeat">
-      <a:schemeClr val="tx1"/>
-    </dgm:txFillClrLst>
-    <dgm:txEffectClrLst/>
-  </dgm:styleLbl>
-  <dgm:styleLbl name="asst0">
-    <dgm:fillClrLst meth="repeat">
-      <a:schemeClr val="accent1"/>
-    </dgm:fillClrLst>
-    <dgm:linClrLst meth="repeat">
-      <a:schemeClr val="lt1"/>
-    </dgm:linClrLst>
-    <dgm:effectClrLst/>
-    <dgm:txLinClrLst/>
-    <dgm:txFillClrLst/>
-    <dgm:txEffectClrLst/>
-  </dgm:styleLbl>
-  <dgm:styleLbl name="asst1">
-    <dgm:fillClrLst meth="repeat">
-      <a:schemeClr val="accent1"/>
-    </dgm:fillClrLst>
-    <dgm:linClrLst meth="repeat">
-      <a:schemeClr val="lt1"/>
-    </dgm:linClrLst>
-    <dgm:effectClrLst/>
-    <dgm:txLinClrLst/>
-    <dgm:txFillClrLst/>
-    <dgm:txEffectClrLst/>
-  </dgm:styleLbl>
-  <dgm:styleLbl name="asst2">
-    <dgm:fillClrLst meth="repeat">
-      <a:schemeClr val="accent1"/>
-    </dgm:fillClrLst>
-    <dgm:linClrLst meth="repeat">
-      <a:schemeClr val="lt1"/>
-    </dgm:linClrLst>
-    <dgm:effectClrLst/>
-    <dgm:txLinClrLst/>
-    <dgm:txFillClrLst/>
-    <dgm:txEffectClrLst/>
-  </dgm:styleLbl>
-  <dgm:styleLbl name="asst3">
-    <dgm:fillClrLst meth="repeat">
-      <a:schemeClr val="accent1"/>
-    </dgm:fillClrLst>
-    <dgm:linClrLst meth="repeat">
-      <a:schemeClr val="lt1"/>
-    </dgm:linClrLst>
-    <dgm:effectClrLst/>
-    <dgm:txLinClrLst/>
-    <dgm:txFillClrLst/>
-    <dgm:txEffectClrLst/>
-  </dgm:styleLbl>
-  <dgm:styleLbl name="asst4">
-    <dgm:fillClrLst meth="repeat">
-      <a:schemeClr val="accent1"/>
-    </dgm:fillClrLst>
-    <dgm:linClrLst meth="repeat">
-      <a:schemeClr val="lt1"/>
-    </dgm:linClrLst>
-    <dgm:effectClrLst/>
-    <dgm:txLinClrLst/>
-    <dgm:txFillClrLst/>
-    <dgm:txEffectClrLst/>
-  </dgm:styleLbl>
-  <dgm:styleLbl name="parChTrans2D1">
-    <dgm:fillClrLst meth="repeat">
-      <a:schemeClr val="accent1">
-        <a:tint val="60000"/>
-      </a:schemeClr>
-    </dgm:fillClrLst>
-    <dgm:linClrLst meth="repeat">
-      <a:schemeClr val="accent1">
-        <a:tint val="60000"/>
-      </a:schemeClr>
-    </dgm:linClrLst>
-    <dgm:effectClrLst/>
-    <dgm:txLinClrLst/>
-    <dgm:txFillClrLst meth="repeat">
-      <a:schemeClr val="lt1"/>
-    </dgm:txFillClrLst>
-    <dgm:txEffectClrLst/>
-  </dgm:styleLbl>
-  <dgm:styleLbl name="parChTrans2D2">
-    <dgm:fillClrLst meth="repeat">
-      <a:schemeClr val="accent1"/>
-    </dgm:fillClrLst>
-    <dgm:linClrLst meth="repeat">
-      <a:schemeClr val="accent1"/>
-    </dgm:linClrLst>
-    <dgm:effectClrLst/>
-    <dgm:txLinClrLst/>
-    <dgm:txFillClrLst meth="repeat">
-      <a:schemeClr val="lt1"/>
-    </dgm:txFillClrLst>
-    <dgm:txEffectClrLst/>
-  </dgm:styleLbl>
-  <dgm:styleLbl name="parChTrans2D3">
-    <dgm:fillClrLst meth="repeat">
-      <a:schemeClr val="accent1"/>
-    </dgm:fillClrLst>
-    <dgm:linClrLst meth="repeat">
-      <a:schemeClr val="accent1"/>
-    </dgm:linClrLst>
-    <dgm:effectClrLst/>
-    <dgm:txLinClrLst/>
-    <dgm:txFillClrLst meth="repeat">
-      <a:schemeClr val="lt1"/>
-    </dgm:txFillClrLst>
-    <dgm:txEffectClrLst/>
-  </dgm:styleLbl>
-  <dgm:styleLbl name="parChTrans2D4">
-    <dgm:fillClrLst meth="repeat">
-      <a:schemeClr val="accent1"/>
-    </dgm:fillClrLst>
-    <dgm:linClrLst meth="repeat">
-      <a:schemeClr val="accent1"/>
-    </dgm:linClrLst>
-    <dgm:effectClrLst/>
-    <dgm:txLinClrLst/>
-    <dgm:txFillClrLst meth="repeat">
-      <a:schemeClr val="lt1"/>
-    </dgm:txFillClrLst>
-    <dgm:txEffectClrLst/>
-  </dgm:styleLbl>
-  <dgm:styleLbl name="parChTrans1D1">
-    <dgm:fillClrLst meth="repeat">
-      <a:schemeClr val="accent1"/>
-    </dgm:fillClrLst>
-    <dgm:linClrLst meth="repeat">
-      <a:schemeClr val="accent1">
-        <a:shade val="60000"/>
-      </a:schemeClr>
-    </dgm:linClrLst>
-    <dgm:effectClrLst/>
-    <dgm:txLinClrLst/>
-    <dgm:txFillClrLst meth="repeat">
-      <a:schemeClr val="tx1"/>
-    </dgm:txFillClrLst>
-    <dgm:txEffectClrLst/>
-  </dgm:styleLbl>
-  <dgm:styleLbl name="parChTrans1D2">
-    <dgm:fillClrLst meth="repeat">
-      <a:schemeClr val="accent1"/>
-    </dgm:fillClrLst>
-    <dgm:linClrLst meth="repeat">
-      <a:schemeClr val="accent1">
-        <a:shade val="60000"/>
-      </a:schemeClr>
-    </dgm:linClrLst>
-    <dgm:effectClrLst/>
-    <dgm:txLinClrLst/>
-    <dgm:txFillClrLst meth="repeat">
-      <a:schemeClr val="tx1"/>
-    </dgm:txFillClrLst>
-    <dgm:txEffectClrLst/>
-  </dgm:styleLbl>
-  <dgm:styleLbl name="parChTrans1D3">
-    <dgm:fillClrLst meth="repeat">
-      <a:schemeClr val="accent1"/>
-    </dgm:fillClrLst>
-    <dgm:linClrLst meth="repeat">
-      <a:schemeClr val="accent1">
-        <a:shade val="80000"/>
-      </a:schemeClr>
-    </dgm:linClrLst>
-    <dgm:effectClrLst/>
-    <dgm:txLinClrLst/>
-    <dgm:txFillClrLst meth="repeat">
-      <a:schemeClr val="tx1"/>
-    </dgm:txFillClrLst>
-    <dgm:txEffectClrLst/>
-  </dgm:styleLbl>
-  <dgm:styleLbl name="parChTrans1D4">
-    <dgm:fillClrLst meth="repeat">
-      <a:schemeClr val="accent1"/>
-    </dgm:fillClrLst>
-    <dgm:linClrLst meth="repeat">
-      <a:schemeClr val="accent1">
-        <a:shade val="80000"/>
-      </a:schemeClr>
-    </dgm:linClrLst>
-    <dgm:effectClrLst/>
-    <dgm:txLinClrLst/>
-    <dgm:txFillClrLst meth="repeat">
-      <a:schemeClr val="tx1"/>
-    </dgm:txFillClrLst>
-    <dgm:txEffectClrLst/>
-  </dgm:styleLbl>
-  <dgm:styleLbl name="fgAcc1">
-    <dgm:fillClrLst meth="repeat">
-      <a:schemeClr val="lt1">
-        <a:alpha val="90000"/>
-      </a:schemeClr>
-    </dgm:fillClrLst>
-    <dgm:linClrLst meth="repeat">
-      <a:schemeClr val="accent1"/>
-    </dgm:linClrLst>
-    <dgm:effectClrLst/>
-    <dgm:txLinClrLst/>
-    <dgm:txFillClrLst meth="repeat">
-      <a:schemeClr val="dk1"/>
-    </dgm:txFillClrLst>
-    <dgm:txEffectClrLst/>
-  </dgm:styleLbl>
-  <dgm:styleLbl name="conFgAcc1">
-    <dgm:fillClrLst meth="repeat">
-      <a:schemeClr val="lt1">
-        <a:alpha val="90000"/>
-      </a:schemeClr>
-    </dgm:fillClrLst>
-    <dgm:linClrLst meth="repeat">
-      <a:schemeClr val="accent1"/>
-    </dgm:linClrLst>
-    <dgm:effectClrLst/>
-    <dgm:txLinClrLst/>
-    <dgm:txFillClrLst meth="repeat">
-      <a:schemeClr val="dk1"/>
-    </dgm:txFillClrLst>
-    <dgm:txEffectClrLst/>
-  </dgm:styleLbl>
-  <dgm:styleLbl name="alignAcc1">
-    <dgm:fillClrLst meth="repeat">
-      <a:schemeClr val="lt1">
-        <a:alpha val="90000"/>
-      </a:schemeClr>
-    </dgm:fillClrLst>
-    <dgm:linClrLst meth="repeat">
-      <a:schemeClr val="accent1"/>
-    </dgm:linClrLst>
-    <dgm:effectClrLst/>
-    <dgm:txLinClrLst/>
-    <dgm:txFillClrLst meth="repeat">
-      <a:schemeClr val="dk1"/>
-    </dgm:txFillClrLst>
-    <dgm:txEffectClrLst/>
-  </dgm:styleLbl>
-  <dgm:styleLbl name="trAlignAcc1">
-    <dgm:fillClrLst meth="repeat">
-      <a:schemeClr val="lt1">
-        <a:alpha val="40000"/>
-      </a:schemeClr>
-    </dgm:fillClrLst>
-    <dgm:linClrLst meth="repeat">
-      <a:schemeClr val="accent1"/>
-    </dgm:linClrLst>
-    <dgm:effectClrLst/>
-    <dgm:txLinClrLst/>
-    <dgm:txFillClrLst meth="repeat">
-      <a:schemeClr val="dk1"/>
-    </dgm:txFillClrLst>
-    <dgm:txEffectClrLst/>
-  </dgm:styleLbl>
-  <dgm:styleLbl name="bgAcc1">
-    <dgm:fillClrLst meth="repeat">
-      <a:schemeClr val="lt1">
-        <a:alpha val="90000"/>
-      </a:schemeClr>
-    </dgm:fillClrLst>
-    <dgm:linClrLst meth="repeat">
-      <a:schemeClr val="accent1"/>
-    </dgm:linClrLst>
-    <dgm:effectClrLst/>
-    <dgm:txLinClrLst/>
-    <dgm:txFillClrLst meth="repeat">
-      <a:schemeClr val="dk1"/>
-    </dgm:txFillClrLst>
-    <dgm:txEffectClrLst/>
-  </dgm:styleLbl>
-  <dgm:styleLbl name="solidFgAcc1">
-    <dgm:fillClrLst meth="repeat">
-      <a:schemeClr val="lt1"/>
-    </dgm:fillClrLst>
-    <dgm:linClrLst meth="repeat">
-      <a:schemeClr val="accent1"/>
-    </dgm:linClrLst>
-    <dgm:effectClrLst/>
-    <dgm:txLinClrLst/>
-    <dgm:txFillClrLst meth="repeat">
-      <a:schemeClr val="dk1"/>
-    </dgm:txFillClrLst>
-    <dgm:txEffectClrLst/>
-  </dgm:styleLbl>
-  <dgm:styleLbl name="solidAlignAcc1">
-    <dgm:fillClrLst meth="repeat">
-      <a:schemeClr val="lt1"/>
-    </dgm:fillClrLst>
-    <dgm:linClrLst meth="repeat">
-      <a:schemeClr val="accent1"/>
-    </dgm:linClrLst>
-    <dgm:effectClrLst/>
-    <dgm:txLinClrLst/>
-    <dgm:txFillClrLst meth="repeat">
-      <a:schemeClr val="dk1"/>
-    </dgm:txFillClrLst>
-    <dgm:txEffectClrLst/>
-  </dgm:styleLbl>
-  <dgm:styleLbl name="solidBgAcc1">
-    <dgm:fillClrLst meth="repeat">
-      <a:schemeClr val="lt1"/>
-    </dgm:fillClrLst>
-    <dgm:linClrLst meth="repeat">
-      <a:schemeClr val="accent1"/>
-    </dgm:linClrLst>
-    <dgm:effectClrLst/>
-    <dgm:txLinClrLst/>
-    <dgm:txFillClrLst meth="repeat">
-      <a:schemeClr val="dk1"/>
-    </dgm:txFillClrLst>
-    <dgm:txEffectClrLst/>
-  </dgm:styleLbl>
-  <dgm:styleLbl name="fgAccFollowNode1">
-    <dgm:fillClrLst meth="repeat">
-      <a:schemeClr val="accent1">
-        <a:alpha val="90000"/>
-        <a:tint val="40000"/>
-      </a:schemeClr>
-    </dgm:fillClrLst>
-    <dgm:linClrLst meth="repeat">
-      <a:schemeClr val="accent1">
-        <a:alpha val="90000"/>
-        <a:tint val="40000"/>
-      </a:schemeClr>
-    </dgm:linClrLst>
-    <dgm:effectClrLst/>
-    <dgm:txLinClrLst/>
-    <dgm:txFillClrLst meth="repeat">
-      <a:schemeClr val="dk1"/>
-    </dgm:txFillClrLst>
-    <dgm:txEffectClrLst/>
-  </dgm:styleLbl>
-  <dgm:styleLbl name="alignAccFollowNode1">
-    <dgm:fillClrLst meth="repeat">
-      <a:schemeClr val="accent1">
-        <a:alpha val="90000"/>
-        <a:tint val="40000"/>
-      </a:schemeClr>
-    </dgm:fillClrLst>
-    <dgm:linClrLst meth="repeat">
-      <a:schemeClr val="accent1">
-        <a:alpha val="90000"/>
-        <a:tint val="40000"/>
-      </a:schemeClr>
-    </dgm:linClrLst>
-    <dgm:effectClrLst/>
-    <dgm:txLinClrLst/>
-    <dgm:txFillClrLst meth="repeat">
-      <a:schemeClr val="dk1"/>
-    </dgm:txFillClrLst>
-    <dgm:txEffectClrLst/>
-  </dgm:styleLbl>
-  <dgm:styleLbl name="bgAccFollowNode1">
-    <dgm:fillClrLst meth="repeat">
-      <a:schemeClr val="accent1">
-        <a:alpha val="90000"/>
-        <a:tint val="40000"/>
-      </a:schemeClr>
-    </dgm:fillClrLst>
-    <dgm:linClrLst meth="repeat">
-      <a:schemeClr val="accent1">
-        <a:alpha val="90000"/>
-        <a:tint val="40000"/>
-      </a:schemeClr>
-    </dgm:linClrLst>
-    <dgm:effectClrLst/>
-    <dgm:txLinClrLst/>
-    <dgm:txFillClrLst meth="repeat">
-      <a:schemeClr val="dk1"/>
-    </dgm:txFillClrLst>
-    <dgm:txEffectClrLst/>
-  </dgm:styleLbl>
-  <dgm:styleLbl name="fgAcc0">
-    <dgm:fillClrLst meth="repeat">
-      <a:schemeClr val="lt1">
-        <a:alpha val="90000"/>
-      </a:schemeClr>
-    </dgm:fillClrLst>
-    <dgm:linClrLst meth="repeat">
-      <a:schemeClr val="accent1"/>
-    </dgm:linClrLst>
-    <dgm:effectClrLst/>
-    <dgm:txLinClrLst/>
-    <dgm:txFillClrLst meth="repeat">
-      <a:schemeClr val="dk1"/>
-    </dgm:txFillClrLst>
-    <dgm:txEffectClrLst/>
-  </dgm:styleLbl>
-  <dgm:styleLbl name="fgAcc2">
-    <dgm:fillClrLst meth="repeat">
-      <a:schemeClr val="lt1">
-        <a:alpha val="90000"/>
-      </a:schemeClr>
-    </dgm:fillClrLst>
-    <dgm:linClrLst meth="repeat">
-      <a:schemeClr val="accent1"/>
-    </dgm:linClrLst>
-    <dgm:effectClrLst/>
-    <dgm:txLinClrLst/>
-    <dgm:txFillClrLst meth="repeat">
-      <a:schemeClr val="dk1"/>
-    </dgm:txFillClrLst>
-    <dgm:txEffectClrLst/>
-  </dgm:styleLbl>
-  <dgm:styleLbl name="fgAcc3">
-    <dgm:fillClrLst meth="repeat">
-      <a:schemeClr val="lt1">
-        <a:alpha val="90000"/>
-      </a:schemeClr>
-    </dgm:fillClrLst>
-    <dgm:linClrLst meth="repeat">
-      <a:schemeClr val="accent1"/>
-    </dgm:linClrLst>
-    <dgm:effectClrLst/>
-    <dgm:txLinClrLst/>
-    <dgm:txFillClrLst meth="repeat">
-      <a:schemeClr val="dk1"/>
-    </dgm:txFillClrLst>
-    <dgm:txEffectClrLst/>
-  </dgm:styleLbl>
-  <dgm:styleLbl name="fgAcc4">
-    <dgm:fillClrLst meth="repeat">
-      <a:schemeClr val="lt1">
-        <a:alpha val="90000"/>
-      </a:schemeClr>
-    </dgm:fillClrLst>
-    <dgm:linClrLst meth="repeat">
-      <a:schemeClr val="accent1"/>
-    </dgm:linClrLst>
-    <dgm:effectClrLst/>
-    <dgm:txLinClrLst/>
-    <dgm:txFillClrLst meth="repeat">
-      <a:schemeClr val="dk1"/>
-    </dgm:txFillClrLst>
-    <dgm:txEffectClrLst/>
-  </dgm:styleLbl>
-  <dgm:styleLbl name="bgShp">
-    <dgm:fillClrLst meth="repeat">
-      <a:schemeClr val="accent1">
-        <a:tint val="40000"/>
-      </a:schemeClr>
-    </dgm:fillClrLst>
-    <dgm:linClrLst meth="repeat">
-      <a:schemeClr val="accent1"/>
-    </dgm:linClrLst>
-    <dgm:effectClrLst/>
-    <dgm:txLinClrLst/>
-    <dgm:txFillClrLst meth="repeat">
-      <a:schemeClr val="dk1"/>
-    </dgm:txFillClrLst>
-    <dgm:txEffectClrLst/>
-  </dgm:styleLbl>
-  <dgm:styleLbl name="dkBgShp">
-    <dgm:fillClrLst meth="repeat">
-      <a:schemeClr val="accent1">
-        <a:shade val="80000"/>
-      </a:schemeClr>
-    </dgm:fillClrLst>
-    <dgm:linClrLst meth="repeat">
-      <a:schemeClr val="accent1"/>
-    </dgm:linClrLst>
-    <dgm:effectClrLst/>
-    <dgm:txLinClrLst/>
-    <dgm:txFillClrLst meth="repeat">
-      <a:schemeClr val="lt1"/>
-    </dgm:txFillClrLst>
-    <dgm:txEffectClrLst/>
-  </dgm:styleLbl>
-  <dgm:styleLbl name="trBgShp">
-    <dgm:fillClrLst meth="repeat">
-      <a:schemeClr val="accent1">
-        <a:tint val="50000"/>
-        <a:alpha val="40000"/>
-      </a:schemeClr>
-    </dgm:fillClrLst>
-    <dgm:linClrLst meth="repeat">
-      <a:schemeClr val="accent1"/>
-    </dgm:linClrLst>
-    <dgm:effectClrLst/>
-    <dgm:txLinClrLst/>
-    <dgm:txFillClrLst meth="repeat">
-      <a:schemeClr val="lt1"/>
-    </dgm:txFillClrLst>
-    <dgm:txEffectClrLst/>
-  </dgm:styleLbl>
-  <dgm:styleLbl name="fgShp">
-    <dgm:fillClrLst meth="repeat">
-      <a:schemeClr val="accent1">
-        <a:tint val="60000"/>
-      </a:schemeClr>
-    </dgm:fillClrLst>
-    <dgm:linClrLst meth="repeat">
-      <a:schemeClr val="lt1"/>
-    </dgm:linClrLst>
-    <dgm:effectClrLst/>
-    <dgm:txLinClrLst/>
-    <dgm:txFillClrLst meth="repeat">
-      <a:schemeClr val="dk1"/>
-    </dgm:txFillClrLst>
-    <dgm:txEffectClrLst/>
-  </dgm:styleLbl>
-  <dgm:styleLbl name="revTx">
-    <dgm:fillClrLst meth="repeat">
-      <a:schemeClr val="lt1">
-        <a:alpha val="0"/>
-      </a:schemeClr>
-    </dgm:fillClrLst>
-    <dgm:linClrLst meth="repeat">
-      <a:schemeClr val="dk1">
-        <a:alpha val="0"/>
-      </a:schemeClr>
-    </dgm:linClrLst>
-    <dgm:effectClrLst/>
-    <dgm:txLinClrLst/>
-    <dgm:txFillClrLst meth="repeat">
-      <a:schemeClr val="tx1"/>
-    </dgm:txFillClrLst>
-    <dgm:txEffectClrLst/>
-  </dgm:styleLbl>
-</dgm:colorsDef>
-</file>
-
-<file path=ppt/diagrams/data1.xml><?xml version="1.0" encoding="utf-8"?>
-<dgm:dataModel xmlns:dgm="http://schemas.openxmlformats.org/drawingml/2006/diagram" xmlns:a="http://schemas.openxmlformats.org/drawingml/2006/main">
-  <dgm:ptLst>
-    <dgm:pt modelId="{928B9BD9-CCD1-FE4B-B336-62050BFE362B}" type="doc">
-      <dgm:prSet loTypeId="urn:microsoft.com/office/officeart/2005/8/layout/radial2" loCatId="" qsTypeId="urn:microsoft.com/office/officeart/2005/8/quickstyle/simple1" qsCatId="simple" csTypeId="urn:microsoft.com/office/officeart/2005/8/colors/accent1_2" csCatId="accent1" phldr="1"/>
-      <dgm:spPr/>
-      <dgm:t>
-        <a:bodyPr/>
-        <a:lstStyle/>
-        <a:p>
-          <a:endParaRPr lang="en-GB"/>
-        </a:p>
-      </dgm:t>
-    </dgm:pt>
-    <dgm:pt modelId="{4F35545C-4EA6-4C4F-982E-64607A5E4D77}">
-      <dgm:prSet phldrT="[Text]"/>
-      <dgm:spPr/>
-      <dgm:t>
-        <a:bodyPr/>
-        <a:lstStyle/>
-        <a:p>
-          <a:r>
-            <a:rPr lang="en-GB" dirty="0"/>
-            <a:t>Breakfast</a:t>
-          </a:r>
-        </a:p>
-      </dgm:t>
-    </dgm:pt>
-    <dgm:pt modelId="{ABD45062-EDE6-F34F-B313-682D767ADF2D}" type="parTrans" cxnId="{07EC1066-AD48-6E48-8C85-3BBCC4825B72}">
-      <dgm:prSet/>
-      <dgm:spPr/>
-      <dgm:t>
-        <a:bodyPr/>
-        <a:lstStyle/>
-        <a:p>
-          <a:endParaRPr lang="en-GB"/>
-        </a:p>
-      </dgm:t>
-    </dgm:pt>
-    <dgm:pt modelId="{1A7A3144-83DD-C148-AE81-6BB222EEA076}" type="sibTrans" cxnId="{07EC1066-AD48-6E48-8C85-3BBCC4825B72}">
-      <dgm:prSet/>
-      <dgm:spPr/>
-      <dgm:t>
-        <a:bodyPr/>
-        <a:lstStyle/>
-        <a:p>
-          <a:endParaRPr lang="en-GB"/>
-        </a:p>
-      </dgm:t>
-    </dgm:pt>
-    <dgm:pt modelId="{C4FCF19C-FA99-084F-BB98-7113B6178599}">
-      <dgm:prSet phldrT="[Text]"/>
-      <dgm:spPr/>
-      <dgm:t>
-        <a:bodyPr/>
-        <a:lstStyle/>
-        <a:p>
-          <a:r>
-            <a:rPr lang="en-GB" dirty="0"/>
-            <a:t>Lunch</a:t>
-          </a:r>
-        </a:p>
-      </dgm:t>
-    </dgm:pt>
-    <dgm:pt modelId="{5CFB6614-EA4B-A94D-AD47-3DA6E839EA12}" type="parTrans" cxnId="{7549DE8F-FD39-2448-A3B3-6E2DAB867839}">
-      <dgm:prSet/>
-      <dgm:spPr/>
-      <dgm:t>
-        <a:bodyPr/>
-        <a:lstStyle/>
-        <a:p>
-          <a:endParaRPr lang="en-GB"/>
-        </a:p>
-      </dgm:t>
-    </dgm:pt>
-    <dgm:pt modelId="{96EB671C-3351-3D42-A761-AB707BEBEBF5}" type="sibTrans" cxnId="{7549DE8F-FD39-2448-A3B3-6E2DAB867839}">
-      <dgm:prSet/>
-      <dgm:spPr/>
-      <dgm:t>
-        <a:bodyPr/>
-        <a:lstStyle/>
-        <a:p>
-          <a:endParaRPr lang="en-GB"/>
-        </a:p>
-      </dgm:t>
-    </dgm:pt>
-    <dgm:pt modelId="{2FF27CD7-4662-6842-ACB1-1302FFD450F7}">
-      <dgm:prSet phldrT="[Text]"/>
-      <dgm:spPr/>
-      <dgm:t>
-        <a:bodyPr/>
-        <a:lstStyle/>
-        <a:p>
-          <a:r>
-            <a:rPr lang="en-GB" dirty="0"/>
-            <a:t>Dinner</a:t>
-          </a:r>
-        </a:p>
-      </dgm:t>
-    </dgm:pt>
-    <dgm:pt modelId="{F17A7F70-59EA-1F45-8DC3-8DC796CEFDA0}" type="parTrans" cxnId="{B27EB687-E3A6-9645-8371-BB7C8FB1CBD8}">
-      <dgm:prSet/>
-      <dgm:spPr/>
-      <dgm:t>
-        <a:bodyPr/>
-        <a:lstStyle/>
-        <a:p>
-          <a:endParaRPr lang="en-GB"/>
-        </a:p>
-      </dgm:t>
-    </dgm:pt>
-    <dgm:pt modelId="{C305BCD8-2D31-7F44-B18F-EFADF4778211}" type="sibTrans" cxnId="{B27EB687-E3A6-9645-8371-BB7C8FB1CBD8}">
-      <dgm:prSet/>
-      <dgm:spPr/>
-      <dgm:t>
-        <a:bodyPr/>
-        <a:lstStyle/>
-        <a:p>
-          <a:endParaRPr lang="en-GB"/>
-        </a:p>
-      </dgm:t>
-    </dgm:pt>
-    <dgm:pt modelId="{0BBA6D34-57BA-9F40-8375-835C2287E7DC}" type="pres">
-      <dgm:prSet presAssocID="{928B9BD9-CCD1-FE4B-B336-62050BFE362B}" presName="composite" presStyleCnt="0">
-        <dgm:presLayoutVars>
-          <dgm:chMax val="5"/>
-          <dgm:dir/>
-          <dgm:animLvl val="ctr"/>
-          <dgm:resizeHandles val="exact"/>
-        </dgm:presLayoutVars>
-      </dgm:prSet>
-      <dgm:spPr/>
-    </dgm:pt>
-    <dgm:pt modelId="{70C118BA-6646-904C-A081-A68E8F35132F}" type="pres">
-      <dgm:prSet presAssocID="{928B9BD9-CCD1-FE4B-B336-62050BFE362B}" presName="cycle" presStyleCnt="0"/>
-      <dgm:spPr/>
-    </dgm:pt>
-    <dgm:pt modelId="{1A91CFB2-70C1-544D-B3F3-A7937875A366}" type="pres">
-      <dgm:prSet presAssocID="{928B9BD9-CCD1-FE4B-B336-62050BFE362B}" presName="centerShape" presStyleCnt="0"/>
-      <dgm:spPr/>
-    </dgm:pt>
-    <dgm:pt modelId="{9EF5DEEC-D370-EB4D-A536-62E25A351FFD}" type="pres">
-      <dgm:prSet presAssocID="{928B9BD9-CCD1-FE4B-B336-62050BFE362B}" presName="connSite" presStyleLbl="node1" presStyleIdx="0" presStyleCnt="4"/>
-      <dgm:spPr/>
-    </dgm:pt>
-    <dgm:pt modelId="{6F11EC79-1D29-FF4B-B3B4-AC6FB651383F}" type="pres">
-      <dgm:prSet presAssocID="{928B9BD9-CCD1-FE4B-B336-62050BFE362B}" presName="visible" presStyleLbl="node1" presStyleIdx="0" presStyleCnt="4"/>
-      <dgm:spPr/>
-    </dgm:pt>
-    <dgm:pt modelId="{2EDB2795-440B-5C42-ACF4-5C42FFA4DB9E}" type="pres">
-      <dgm:prSet presAssocID="{ABD45062-EDE6-F34F-B313-682D767ADF2D}" presName="Name25" presStyleLbl="parChTrans1D1" presStyleIdx="0" presStyleCnt="3"/>
-      <dgm:spPr/>
-    </dgm:pt>
-    <dgm:pt modelId="{3C15460D-226B-3A45-9408-615094F1E255}" type="pres">
-      <dgm:prSet presAssocID="{4F35545C-4EA6-4C4F-982E-64607A5E4D77}" presName="node" presStyleCnt="0"/>
-      <dgm:spPr/>
-    </dgm:pt>
-    <dgm:pt modelId="{90144700-9D71-8245-9F8E-03AAB3960BBB}" type="pres">
-      <dgm:prSet presAssocID="{4F35545C-4EA6-4C4F-982E-64607A5E4D77}" presName="parentNode" presStyleLbl="node1" presStyleIdx="1" presStyleCnt="4">
-        <dgm:presLayoutVars>
-          <dgm:chMax val="1"/>
-          <dgm:bulletEnabled val="1"/>
-        </dgm:presLayoutVars>
-      </dgm:prSet>
-      <dgm:spPr/>
-    </dgm:pt>
-    <dgm:pt modelId="{EEA3482E-04D4-9F4A-986C-997E76F792AB}" type="pres">
-      <dgm:prSet presAssocID="{4F35545C-4EA6-4C4F-982E-64607A5E4D77}" presName="childNode" presStyleLbl="revTx" presStyleIdx="0" presStyleCnt="0">
-        <dgm:presLayoutVars>
-          <dgm:bulletEnabled val="1"/>
-        </dgm:presLayoutVars>
-      </dgm:prSet>
-      <dgm:spPr/>
-    </dgm:pt>
-    <dgm:pt modelId="{2D691C4C-D66C-0F4E-82E0-9B4205CD9093}" type="pres">
-      <dgm:prSet presAssocID="{5CFB6614-EA4B-A94D-AD47-3DA6E839EA12}" presName="Name25" presStyleLbl="parChTrans1D1" presStyleIdx="1" presStyleCnt="3"/>
-      <dgm:spPr/>
-    </dgm:pt>
-    <dgm:pt modelId="{B461A172-BD87-C645-AC19-0AF56A248EC3}" type="pres">
-      <dgm:prSet presAssocID="{C4FCF19C-FA99-084F-BB98-7113B6178599}" presName="node" presStyleCnt="0"/>
-      <dgm:spPr/>
-    </dgm:pt>
-    <dgm:pt modelId="{180EF10B-F19F-A847-89C8-E28731DCF413}" type="pres">
-      <dgm:prSet presAssocID="{C4FCF19C-FA99-084F-BB98-7113B6178599}" presName="parentNode" presStyleLbl="node1" presStyleIdx="2" presStyleCnt="4">
-        <dgm:presLayoutVars>
-          <dgm:chMax val="1"/>
-          <dgm:bulletEnabled val="1"/>
-        </dgm:presLayoutVars>
-      </dgm:prSet>
-      <dgm:spPr/>
-    </dgm:pt>
-    <dgm:pt modelId="{658D6054-810C-ED40-9E90-DA0B9D682293}" type="pres">
-      <dgm:prSet presAssocID="{C4FCF19C-FA99-084F-BB98-7113B6178599}" presName="childNode" presStyleLbl="revTx" presStyleIdx="0" presStyleCnt="0">
-        <dgm:presLayoutVars>
-          <dgm:bulletEnabled val="1"/>
-        </dgm:presLayoutVars>
-      </dgm:prSet>
-      <dgm:spPr/>
-    </dgm:pt>
-    <dgm:pt modelId="{BB4F29F6-E85C-9047-8801-5BA1BA88BC8A}" type="pres">
-      <dgm:prSet presAssocID="{F17A7F70-59EA-1F45-8DC3-8DC796CEFDA0}" presName="Name25" presStyleLbl="parChTrans1D1" presStyleIdx="2" presStyleCnt="3"/>
-      <dgm:spPr/>
-    </dgm:pt>
-    <dgm:pt modelId="{931E7E62-4C9F-2D43-B6FD-3FDE99A858CC}" type="pres">
-      <dgm:prSet presAssocID="{2FF27CD7-4662-6842-ACB1-1302FFD450F7}" presName="node" presStyleCnt="0"/>
-      <dgm:spPr/>
-    </dgm:pt>
-    <dgm:pt modelId="{34096524-C20B-3548-BA0A-C8C640100292}" type="pres">
-      <dgm:prSet presAssocID="{2FF27CD7-4662-6842-ACB1-1302FFD450F7}" presName="parentNode" presStyleLbl="node1" presStyleIdx="3" presStyleCnt="4">
-        <dgm:presLayoutVars>
-          <dgm:chMax val="1"/>
-          <dgm:bulletEnabled val="1"/>
-        </dgm:presLayoutVars>
-      </dgm:prSet>
-      <dgm:spPr/>
-    </dgm:pt>
-    <dgm:pt modelId="{40A552A1-5317-B845-A293-8079651EEBDC}" type="pres">
-      <dgm:prSet presAssocID="{2FF27CD7-4662-6842-ACB1-1302FFD450F7}" presName="childNode" presStyleLbl="revTx" presStyleIdx="0" presStyleCnt="0">
-        <dgm:presLayoutVars>
-          <dgm:bulletEnabled val="1"/>
-        </dgm:presLayoutVars>
-      </dgm:prSet>
-      <dgm:spPr/>
-    </dgm:pt>
-  </dgm:ptLst>
-  <dgm:cxnLst>
-    <dgm:cxn modelId="{69BE2812-D08F-8942-822E-33A1B9E356CF}" type="presOf" srcId="{4F35545C-4EA6-4C4F-982E-64607A5E4D77}" destId="{90144700-9D71-8245-9F8E-03AAB3960BBB}" srcOrd="0" destOrd="0" presId="urn:microsoft.com/office/officeart/2005/8/layout/radial2"/>
-    <dgm:cxn modelId="{C598831A-7C21-C94D-8D1B-72D7235A67E4}" type="presOf" srcId="{928B9BD9-CCD1-FE4B-B336-62050BFE362B}" destId="{0BBA6D34-57BA-9F40-8375-835C2287E7DC}" srcOrd="0" destOrd="0" presId="urn:microsoft.com/office/officeart/2005/8/layout/radial2"/>
-    <dgm:cxn modelId="{EA5A803C-A05B-C94B-B176-933561AE5F90}" type="presOf" srcId="{F17A7F70-59EA-1F45-8DC3-8DC796CEFDA0}" destId="{BB4F29F6-E85C-9047-8801-5BA1BA88BC8A}" srcOrd="0" destOrd="0" presId="urn:microsoft.com/office/officeart/2005/8/layout/radial2"/>
-    <dgm:cxn modelId="{BE5B4764-BB1B-FD40-856C-44A924AD5BD0}" type="presOf" srcId="{C4FCF19C-FA99-084F-BB98-7113B6178599}" destId="{180EF10B-F19F-A847-89C8-E28731DCF413}" srcOrd="0" destOrd="0" presId="urn:microsoft.com/office/officeart/2005/8/layout/radial2"/>
-    <dgm:cxn modelId="{07EC1066-AD48-6E48-8C85-3BBCC4825B72}" srcId="{928B9BD9-CCD1-FE4B-B336-62050BFE362B}" destId="{4F35545C-4EA6-4C4F-982E-64607A5E4D77}" srcOrd="0" destOrd="0" parTransId="{ABD45062-EDE6-F34F-B313-682D767ADF2D}" sibTransId="{1A7A3144-83DD-C148-AE81-6BB222EEA076}"/>
-    <dgm:cxn modelId="{B27EB687-E3A6-9645-8371-BB7C8FB1CBD8}" srcId="{928B9BD9-CCD1-FE4B-B336-62050BFE362B}" destId="{2FF27CD7-4662-6842-ACB1-1302FFD450F7}" srcOrd="2" destOrd="0" parTransId="{F17A7F70-59EA-1F45-8DC3-8DC796CEFDA0}" sibTransId="{C305BCD8-2D31-7F44-B18F-EFADF4778211}"/>
-    <dgm:cxn modelId="{7549DE8F-FD39-2448-A3B3-6E2DAB867839}" srcId="{928B9BD9-CCD1-FE4B-B336-62050BFE362B}" destId="{C4FCF19C-FA99-084F-BB98-7113B6178599}" srcOrd="1" destOrd="0" parTransId="{5CFB6614-EA4B-A94D-AD47-3DA6E839EA12}" sibTransId="{96EB671C-3351-3D42-A761-AB707BEBEBF5}"/>
-    <dgm:cxn modelId="{68C4B396-8048-A446-9858-E3E96A77331C}" type="presOf" srcId="{ABD45062-EDE6-F34F-B313-682D767ADF2D}" destId="{2EDB2795-440B-5C42-ACF4-5C42FFA4DB9E}" srcOrd="0" destOrd="0" presId="urn:microsoft.com/office/officeart/2005/8/layout/radial2"/>
-    <dgm:cxn modelId="{FAED76A4-4DF3-5641-8598-84A408878755}" type="presOf" srcId="{2FF27CD7-4662-6842-ACB1-1302FFD450F7}" destId="{34096524-C20B-3548-BA0A-C8C640100292}" srcOrd="0" destOrd="0" presId="urn:microsoft.com/office/officeart/2005/8/layout/radial2"/>
-    <dgm:cxn modelId="{0E1C6BBC-D023-6440-B591-F79967B6D350}" type="presOf" srcId="{5CFB6614-EA4B-A94D-AD47-3DA6E839EA12}" destId="{2D691C4C-D66C-0F4E-82E0-9B4205CD9093}" srcOrd="0" destOrd="0" presId="urn:microsoft.com/office/officeart/2005/8/layout/radial2"/>
-    <dgm:cxn modelId="{F5F5A3D8-4233-3348-A92B-46FFF1BF38FA}" type="presParOf" srcId="{0BBA6D34-57BA-9F40-8375-835C2287E7DC}" destId="{70C118BA-6646-904C-A081-A68E8F35132F}" srcOrd="0" destOrd="0" presId="urn:microsoft.com/office/officeart/2005/8/layout/radial2"/>
-    <dgm:cxn modelId="{F62FDBAB-D8F9-0544-906C-B7F2A3A3B52C}" type="presParOf" srcId="{70C118BA-6646-904C-A081-A68E8F35132F}" destId="{1A91CFB2-70C1-544D-B3F3-A7937875A366}" srcOrd="0" destOrd="0" presId="urn:microsoft.com/office/officeart/2005/8/layout/radial2"/>
-    <dgm:cxn modelId="{57815BC3-6F6C-B14F-905C-9C116ECDAA75}" type="presParOf" srcId="{1A91CFB2-70C1-544D-B3F3-A7937875A366}" destId="{9EF5DEEC-D370-EB4D-A536-62E25A351FFD}" srcOrd="0" destOrd="0" presId="urn:microsoft.com/office/officeart/2005/8/layout/radial2"/>
-    <dgm:cxn modelId="{50C12367-EA1F-A249-88FB-9AC3A2B9707F}" type="presParOf" srcId="{1A91CFB2-70C1-544D-B3F3-A7937875A366}" destId="{6F11EC79-1D29-FF4B-B3B4-AC6FB651383F}" srcOrd="1" destOrd="0" presId="urn:microsoft.com/office/officeart/2005/8/layout/radial2"/>
-    <dgm:cxn modelId="{903AA31E-EF2D-9145-81DC-546C2961A65F}" type="presParOf" srcId="{70C118BA-6646-904C-A081-A68E8F35132F}" destId="{2EDB2795-440B-5C42-ACF4-5C42FFA4DB9E}" srcOrd="1" destOrd="0" presId="urn:microsoft.com/office/officeart/2005/8/layout/radial2"/>
-    <dgm:cxn modelId="{B92FEFDF-D448-D342-BB1B-416DDBA86D5F}" type="presParOf" srcId="{70C118BA-6646-904C-A081-A68E8F35132F}" destId="{3C15460D-226B-3A45-9408-615094F1E255}" srcOrd="2" destOrd="0" presId="urn:microsoft.com/office/officeart/2005/8/layout/radial2"/>
-    <dgm:cxn modelId="{DC00E148-4842-A045-B9D1-1AC501CA2BBF}" type="presParOf" srcId="{3C15460D-226B-3A45-9408-615094F1E255}" destId="{90144700-9D71-8245-9F8E-03AAB3960BBB}" srcOrd="0" destOrd="0" presId="urn:microsoft.com/office/officeart/2005/8/layout/radial2"/>
-    <dgm:cxn modelId="{8B71D41D-26ED-3243-A155-EFCA89885621}" type="presParOf" srcId="{3C15460D-226B-3A45-9408-615094F1E255}" destId="{EEA3482E-04D4-9F4A-986C-997E76F792AB}" srcOrd="1" destOrd="0" presId="urn:microsoft.com/office/officeart/2005/8/layout/radial2"/>
-    <dgm:cxn modelId="{B42527D1-F684-8F42-BB31-4301ECBDC944}" type="presParOf" srcId="{70C118BA-6646-904C-A081-A68E8F35132F}" destId="{2D691C4C-D66C-0F4E-82E0-9B4205CD9093}" srcOrd="3" destOrd="0" presId="urn:microsoft.com/office/officeart/2005/8/layout/radial2"/>
-    <dgm:cxn modelId="{42DAA87E-E0C8-7747-BD3C-9A6267DBE9AF}" type="presParOf" srcId="{70C118BA-6646-904C-A081-A68E8F35132F}" destId="{B461A172-BD87-C645-AC19-0AF56A248EC3}" srcOrd="4" destOrd="0" presId="urn:microsoft.com/office/officeart/2005/8/layout/radial2"/>
-    <dgm:cxn modelId="{6A79576C-2ECA-BE4A-A0BD-817BFA0E55EC}" type="presParOf" srcId="{B461A172-BD87-C645-AC19-0AF56A248EC3}" destId="{180EF10B-F19F-A847-89C8-E28731DCF413}" srcOrd="0" destOrd="0" presId="urn:microsoft.com/office/officeart/2005/8/layout/radial2"/>
-    <dgm:cxn modelId="{C301F6B1-3007-C947-A83C-85CC2514FB85}" type="presParOf" srcId="{B461A172-BD87-C645-AC19-0AF56A248EC3}" destId="{658D6054-810C-ED40-9E90-DA0B9D682293}" srcOrd="1" destOrd="0" presId="urn:microsoft.com/office/officeart/2005/8/layout/radial2"/>
-    <dgm:cxn modelId="{244D7336-E141-3D4E-8010-168DEAEDDB85}" type="presParOf" srcId="{70C118BA-6646-904C-A081-A68E8F35132F}" destId="{BB4F29F6-E85C-9047-8801-5BA1BA88BC8A}" srcOrd="5" destOrd="0" presId="urn:microsoft.com/office/officeart/2005/8/layout/radial2"/>
-    <dgm:cxn modelId="{AF300F01-FC51-004B-A393-E499CB72AB9E}" type="presParOf" srcId="{70C118BA-6646-904C-A081-A68E8F35132F}" destId="{931E7E62-4C9F-2D43-B6FD-3FDE99A858CC}" srcOrd="6" destOrd="0" presId="urn:microsoft.com/office/officeart/2005/8/layout/radial2"/>
-    <dgm:cxn modelId="{EF01B02E-F9C5-F843-999A-322D2EEC11AC}" type="presParOf" srcId="{931E7E62-4C9F-2D43-B6FD-3FDE99A858CC}" destId="{34096524-C20B-3548-BA0A-C8C640100292}" srcOrd="0" destOrd="0" presId="urn:microsoft.com/office/officeart/2005/8/layout/radial2"/>
-    <dgm:cxn modelId="{6B8B1B48-8898-9E48-AB70-607B08D61F90}" type="presParOf" srcId="{931E7E62-4C9F-2D43-B6FD-3FDE99A858CC}" destId="{40A552A1-5317-B845-A293-8079651EEBDC}" srcOrd="1" destOrd="0" presId="urn:microsoft.com/office/officeart/2005/8/layout/radial2"/>
-  </dgm:cxnLst>
-  <dgm:bg/>
-  <dgm:whole/>
-  <dgm:extLst>
-    <a:ext uri="http://schemas.microsoft.com/office/drawing/2008/diagram">
-      <dsp:dataModelExt xmlns:dsp="http://schemas.microsoft.com/office/drawing/2008/diagram" relId="rId8" minVer="http://schemas.openxmlformats.org/drawingml/2006/diagram"/>
-    </a:ext>
-  </dgm:extLst>
-</dgm:dataModel>
-</file>
-
-<file path=ppt/diagrams/drawing1.xml><?xml version="1.0" encoding="utf-8"?>
-<dsp:drawing xmlns:dgm="http://schemas.openxmlformats.org/drawingml/2006/diagram" xmlns:dsp="http://schemas.microsoft.com/office/drawing/2008/diagram" xmlns:a="http://schemas.openxmlformats.org/drawingml/2006/main">
-  <dsp:spTree>
-    <dsp:nvGrpSpPr>
-      <dsp:cNvPr id="0" name=""/>
-      <dsp:cNvGrpSpPr/>
-    </dsp:nvGrpSpPr>
-    <dsp:grpSpPr/>
-    <dsp:sp modelId="{BB4F29F6-E85C-9047-8801-5BA1BA88BC8A}">
-      <dsp:nvSpPr>
-        <dsp:cNvPr id="0" name=""/>
-        <dsp:cNvSpPr/>
-      </dsp:nvSpPr>
-      <dsp:spPr>
-        <a:xfrm rot="2563250">
-          <a:off x="3232776" y="2722623"/>
-          <a:ext cx="584929" cy="39067"/>
-        </a:xfrm>
-        <a:custGeom>
-          <a:avLst/>
-          <a:gdLst/>
-          <a:ahLst/>
-          <a:cxnLst/>
-          <a:rect l="0" t="0" r="0" b="0"/>
-          <a:pathLst>
-            <a:path>
-              <a:moveTo>
-                <a:pt x="0" y="19533"/>
-              </a:moveTo>
-              <a:lnTo>
-                <a:pt x="584929" y="19533"/>
-              </a:lnTo>
-            </a:path>
-          </a:pathLst>
-        </a:custGeom>
-        <a:noFill/>
-        <a:ln w="19050" cap="rnd" cmpd="sng" algn="ctr">
-          <a:solidFill>
-            <a:schemeClr val="accent1">
-              <a:shade val="60000"/>
-              <a:hueOff val="0"/>
-              <a:satOff val="0"/>
-              <a:lumOff val="0"/>
-              <a:alphaOff val="0"/>
-            </a:schemeClr>
-          </a:solidFill>
-          <a:prstDash val="solid"/>
-        </a:ln>
-        <a:effectLst/>
-      </dsp:spPr>
-      <dsp:style>
-        <a:lnRef idx="2">
-          <a:scrgbClr r="0" g="0" b="0"/>
-        </a:lnRef>
-        <a:fillRef idx="0">
-          <a:scrgbClr r="0" g="0" b="0"/>
-        </a:fillRef>
-        <a:effectRef idx="0">
-          <a:scrgbClr r="0" g="0" b="0"/>
-        </a:effectRef>
-        <a:fontRef idx="minor"/>
-      </dsp:style>
-    </dsp:sp>
-    <dsp:sp modelId="{2D691C4C-D66C-0F4E-82E0-9B4205CD9093}">
-      <dsp:nvSpPr>
-        <dsp:cNvPr id="0" name=""/>
-        <dsp:cNvSpPr/>
-      </dsp:nvSpPr>
-      <dsp:spPr>
-        <a:xfrm>
-          <a:off x="3310376" y="1921184"/>
-          <a:ext cx="650874" cy="39067"/>
-        </a:xfrm>
-        <a:custGeom>
-          <a:avLst/>
-          <a:gdLst/>
-          <a:ahLst/>
-          <a:cxnLst/>
-          <a:rect l="0" t="0" r="0" b="0"/>
-          <a:pathLst>
-            <a:path>
-              <a:moveTo>
-                <a:pt x="0" y="19533"/>
-              </a:moveTo>
-              <a:lnTo>
-                <a:pt x="650874" y="19533"/>
-              </a:lnTo>
-            </a:path>
-          </a:pathLst>
-        </a:custGeom>
-        <a:noFill/>
-        <a:ln w="19050" cap="rnd" cmpd="sng" algn="ctr">
-          <a:solidFill>
-            <a:schemeClr val="accent1">
-              <a:shade val="60000"/>
-              <a:hueOff val="0"/>
-              <a:satOff val="0"/>
-              <a:lumOff val="0"/>
-              <a:alphaOff val="0"/>
-            </a:schemeClr>
-          </a:solidFill>
-          <a:prstDash val="solid"/>
-        </a:ln>
-        <a:effectLst/>
-      </dsp:spPr>
-      <dsp:style>
-        <a:lnRef idx="2">
-          <a:scrgbClr r="0" g="0" b="0"/>
-        </a:lnRef>
-        <a:fillRef idx="0">
-          <a:scrgbClr r="0" g="0" b="0"/>
-        </a:fillRef>
-        <a:effectRef idx="0">
-          <a:scrgbClr r="0" g="0" b="0"/>
-        </a:effectRef>
-        <a:fontRef idx="minor"/>
-      </dsp:style>
-    </dsp:sp>
-    <dsp:sp modelId="{2EDB2795-440B-5C42-ACF4-5C42FFA4DB9E}">
-      <dsp:nvSpPr>
-        <dsp:cNvPr id="0" name=""/>
-        <dsp:cNvSpPr/>
-      </dsp:nvSpPr>
-      <dsp:spPr>
-        <a:xfrm rot="19036750">
-          <a:off x="3232776" y="1119745"/>
-          <a:ext cx="584929" cy="39067"/>
-        </a:xfrm>
-        <a:custGeom>
-          <a:avLst/>
-          <a:gdLst/>
-          <a:ahLst/>
-          <a:cxnLst/>
-          <a:rect l="0" t="0" r="0" b="0"/>
-          <a:pathLst>
-            <a:path>
-              <a:moveTo>
-                <a:pt x="0" y="19533"/>
-              </a:moveTo>
-              <a:lnTo>
-                <a:pt x="584929" y="19533"/>
-              </a:lnTo>
-            </a:path>
-          </a:pathLst>
-        </a:custGeom>
-        <a:noFill/>
-        <a:ln w="19050" cap="rnd" cmpd="sng" algn="ctr">
-          <a:solidFill>
-            <a:schemeClr val="accent1">
-              <a:shade val="60000"/>
-              <a:hueOff val="0"/>
-              <a:satOff val="0"/>
-              <a:lumOff val="0"/>
-              <a:alphaOff val="0"/>
-            </a:schemeClr>
-          </a:solidFill>
-          <a:prstDash val="solid"/>
-        </a:ln>
-        <a:effectLst/>
-      </dsp:spPr>
-      <dsp:style>
-        <a:lnRef idx="2">
-          <a:scrgbClr r="0" g="0" b="0"/>
-        </a:lnRef>
-        <a:fillRef idx="0">
-          <a:scrgbClr r="0" g="0" b="0"/>
-        </a:fillRef>
-        <a:effectRef idx="0">
-          <a:scrgbClr r="0" g="0" b="0"/>
-        </a:effectRef>
-        <a:fontRef idx="minor"/>
-      </dsp:style>
-    </dsp:sp>
-    <dsp:sp modelId="{6F11EC79-1D29-FF4B-B3B4-AC6FB651383F}">
-      <dsp:nvSpPr>
-        <dsp:cNvPr id="0" name=""/>
-        <dsp:cNvSpPr/>
-      </dsp:nvSpPr>
-      <dsp:spPr>
-        <a:xfrm>
-          <a:off x="1724486" y="1007842"/>
-          <a:ext cx="1865752" cy="1865752"/>
-        </a:xfrm>
-        <a:prstGeom prst="ellipse">
-          <a:avLst/>
-        </a:prstGeom>
-        <a:solidFill>
-          <a:schemeClr val="accent1">
-            <a:hueOff val="0"/>
-            <a:satOff val="0"/>
-            <a:lumOff val="0"/>
-            <a:alphaOff val="0"/>
-          </a:schemeClr>
-        </a:solidFill>
-        <a:ln w="19050" cap="rnd" cmpd="sng" algn="ctr">
-          <a:solidFill>
-            <a:schemeClr val="lt1">
-              <a:hueOff val="0"/>
-              <a:satOff val="0"/>
-              <a:lumOff val="0"/>
-              <a:alphaOff val="0"/>
-            </a:schemeClr>
-          </a:solidFill>
-          <a:prstDash val="solid"/>
-        </a:ln>
-        <a:effectLst/>
-      </dsp:spPr>
-      <dsp:style>
-        <a:lnRef idx="2">
-          <a:scrgbClr r="0" g="0" b="0"/>
-        </a:lnRef>
-        <a:fillRef idx="1">
-          <a:scrgbClr r="0" g="0" b="0"/>
-        </a:fillRef>
-        <a:effectRef idx="0">
-          <a:scrgbClr r="0" g="0" b="0"/>
-        </a:effectRef>
-        <a:fontRef idx="minor">
-          <a:schemeClr val="lt1"/>
-        </a:fontRef>
-      </dsp:style>
-    </dsp:sp>
-    <dsp:sp modelId="{90144700-9D71-8245-9F8E-03AAB3960BBB}">
-      <dsp:nvSpPr>
-        <dsp:cNvPr id="0" name=""/>
-        <dsp:cNvSpPr/>
-      </dsp:nvSpPr>
-      <dsp:spPr>
-        <a:xfrm>
-          <a:off x="3591592" y="1405"/>
-          <a:ext cx="1119451" cy="1119451"/>
-        </a:xfrm>
-        <a:prstGeom prst="ellipse">
-          <a:avLst/>
-        </a:prstGeom>
-        <a:solidFill>
-          <a:schemeClr val="accent1">
-            <a:hueOff val="0"/>
-            <a:satOff val="0"/>
-            <a:lumOff val="0"/>
-            <a:alphaOff val="0"/>
-          </a:schemeClr>
-        </a:solidFill>
-        <a:ln w="19050" cap="rnd" cmpd="sng" algn="ctr">
-          <a:solidFill>
-            <a:schemeClr val="lt1">
-              <a:hueOff val="0"/>
-              <a:satOff val="0"/>
-              <a:lumOff val="0"/>
-              <a:alphaOff val="0"/>
-            </a:schemeClr>
-          </a:solidFill>
-          <a:prstDash val="solid"/>
-        </a:ln>
-        <a:effectLst/>
-      </dsp:spPr>
-      <dsp:style>
-        <a:lnRef idx="2">
-          <a:scrgbClr r="0" g="0" b="0"/>
-        </a:lnRef>
-        <a:fillRef idx="1">
-          <a:scrgbClr r="0" g="0" b="0"/>
-        </a:fillRef>
-        <a:effectRef idx="0">
-          <a:scrgbClr r="0" g="0" b="0"/>
-        </a:effectRef>
-        <a:fontRef idx="minor">
-          <a:schemeClr val="lt1"/>
-        </a:fontRef>
-      </dsp:style>
-      <dsp:txBody>
-        <a:bodyPr spcFirstLastPara="0" vert="horz" wrap="square" lIns="8890" tIns="8890" rIns="8890" bIns="8890" numCol="1" spcCol="1270" anchor="ctr" anchorCtr="0">
-          <a:noAutofit/>
-        </a:bodyPr>
-        <a:lstStyle/>
-        <a:p>
-          <a:pPr marL="0" lvl="0" indent="0" algn="ctr" defTabSz="622300">
-            <a:lnSpc>
-              <a:spcPct val="90000"/>
-            </a:lnSpc>
-            <a:spcBef>
-              <a:spcPct val="0"/>
-            </a:spcBef>
-            <a:spcAft>
-              <a:spcPct val="35000"/>
-            </a:spcAft>
-            <a:buNone/>
-          </a:pPr>
-          <a:r>
-            <a:rPr lang="en-GB" sz="1400" kern="1200" dirty="0"/>
-            <a:t>Breakfast</a:t>
-          </a:r>
-        </a:p>
-      </dsp:txBody>
-      <dsp:txXfrm>
-        <a:off x="3755532" y="165345"/>
-        <a:ext cx="791571" cy="791571"/>
-      </dsp:txXfrm>
-    </dsp:sp>
-    <dsp:sp modelId="{180EF10B-F19F-A847-89C8-E28731DCF413}">
-      <dsp:nvSpPr>
-        <dsp:cNvPr id="0" name=""/>
-        <dsp:cNvSpPr/>
-      </dsp:nvSpPr>
-      <dsp:spPr>
-        <a:xfrm>
-          <a:off x="3961251" y="1380992"/>
-          <a:ext cx="1119451" cy="1119451"/>
-        </a:xfrm>
-        <a:prstGeom prst="ellipse">
-          <a:avLst/>
-        </a:prstGeom>
-        <a:solidFill>
-          <a:schemeClr val="accent1">
-            <a:hueOff val="0"/>
-            <a:satOff val="0"/>
-            <a:lumOff val="0"/>
-            <a:alphaOff val="0"/>
-          </a:schemeClr>
-        </a:solidFill>
-        <a:ln w="19050" cap="rnd" cmpd="sng" algn="ctr">
-          <a:solidFill>
-            <a:schemeClr val="lt1">
-              <a:hueOff val="0"/>
-              <a:satOff val="0"/>
-              <a:lumOff val="0"/>
-              <a:alphaOff val="0"/>
-            </a:schemeClr>
-          </a:solidFill>
-          <a:prstDash val="solid"/>
-        </a:ln>
-        <a:effectLst/>
-      </dsp:spPr>
-      <dsp:style>
-        <a:lnRef idx="2">
-          <a:scrgbClr r="0" g="0" b="0"/>
-        </a:lnRef>
-        <a:fillRef idx="1">
-          <a:scrgbClr r="0" g="0" b="0"/>
-        </a:fillRef>
-        <a:effectRef idx="0">
-          <a:scrgbClr r="0" g="0" b="0"/>
-        </a:effectRef>
-        <a:fontRef idx="minor">
-          <a:schemeClr val="lt1"/>
-        </a:fontRef>
-      </dsp:style>
-      <dsp:txBody>
-        <a:bodyPr spcFirstLastPara="0" vert="horz" wrap="square" lIns="8890" tIns="8890" rIns="8890" bIns="8890" numCol="1" spcCol="1270" anchor="ctr" anchorCtr="0">
-          <a:noAutofit/>
-        </a:bodyPr>
-        <a:lstStyle/>
-        <a:p>
-          <a:pPr marL="0" lvl="0" indent="0" algn="ctr" defTabSz="622300">
-            <a:lnSpc>
-              <a:spcPct val="90000"/>
-            </a:lnSpc>
-            <a:spcBef>
-              <a:spcPct val="0"/>
-            </a:spcBef>
-            <a:spcAft>
-              <a:spcPct val="35000"/>
-            </a:spcAft>
-            <a:buNone/>
-          </a:pPr>
-          <a:r>
-            <a:rPr lang="en-GB" sz="1400" kern="1200" dirty="0"/>
-            <a:t>Lunch</a:t>
-          </a:r>
-        </a:p>
-      </dsp:txBody>
-      <dsp:txXfrm>
-        <a:off x="4125191" y="1544932"/>
-        <a:ext cx="791571" cy="791571"/>
-      </dsp:txXfrm>
-    </dsp:sp>
-    <dsp:sp modelId="{34096524-C20B-3548-BA0A-C8C640100292}">
-      <dsp:nvSpPr>
-        <dsp:cNvPr id="0" name=""/>
-        <dsp:cNvSpPr/>
-      </dsp:nvSpPr>
-      <dsp:spPr>
-        <a:xfrm>
-          <a:off x="3591592" y="2760580"/>
-          <a:ext cx="1119451" cy="1119451"/>
-        </a:xfrm>
-        <a:prstGeom prst="ellipse">
-          <a:avLst/>
-        </a:prstGeom>
-        <a:solidFill>
-          <a:schemeClr val="accent1">
-            <a:hueOff val="0"/>
-            <a:satOff val="0"/>
-            <a:lumOff val="0"/>
-            <a:alphaOff val="0"/>
-          </a:schemeClr>
-        </a:solidFill>
-        <a:ln w="19050" cap="rnd" cmpd="sng" algn="ctr">
-          <a:solidFill>
-            <a:schemeClr val="lt1">
-              <a:hueOff val="0"/>
-              <a:satOff val="0"/>
-              <a:lumOff val="0"/>
-              <a:alphaOff val="0"/>
-            </a:schemeClr>
-          </a:solidFill>
-          <a:prstDash val="solid"/>
-        </a:ln>
-        <a:effectLst/>
-      </dsp:spPr>
-      <dsp:style>
-        <a:lnRef idx="2">
-          <a:scrgbClr r="0" g="0" b="0"/>
-        </a:lnRef>
-        <a:fillRef idx="1">
-          <a:scrgbClr r="0" g="0" b="0"/>
-        </a:fillRef>
-        <a:effectRef idx="0">
-          <a:scrgbClr r="0" g="0" b="0"/>
-        </a:effectRef>
-        <a:fontRef idx="minor">
-          <a:schemeClr val="lt1"/>
-        </a:fontRef>
-      </dsp:style>
-      <dsp:txBody>
-        <a:bodyPr spcFirstLastPara="0" vert="horz" wrap="square" lIns="8890" tIns="8890" rIns="8890" bIns="8890" numCol="1" spcCol="1270" anchor="ctr" anchorCtr="0">
-          <a:noAutofit/>
-        </a:bodyPr>
-        <a:lstStyle/>
-        <a:p>
-          <a:pPr marL="0" lvl="0" indent="0" algn="ctr" defTabSz="622300">
-            <a:lnSpc>
-              <a:spcPct val="90000"/>
-            </a:lnSpc>
-            <a:spcBef>
-              <a:spcPct val="0"/>
-            </a:spcBef>
-            <a:spcAft>
-              <a:spcPct val="35000"/>
-            </a:spcAft>
-            <a:buNone/>
-          </a:pPr>
-          <a:r>
-            <a:rPr lang="en-GB" sz="1400" kern="1200" dirty="0"/>
-            <a:t>Dinner</a:t>
-          </a:r>
-        </a:p>
-      </dsp:txBody>
-      <dsp:txXfrm>
-        <a:off x="3755532" y="2924520"/>
-        <a:ext cx="791571" cy="791571"/>
-      </dsp:txXfrm>
-    </dsp:sp>
-  </dsp:spTree>
-</dsp:drawing>
-</file>
-
-<file path=ppt/diagrams/layout1.xml><?xml version="1.0" encoding="utf-8"?>
-<dgm:layoutDef xmlns:dgm="http://schemas.openxmlformats.org/drawingml/2006/diagram" xmlns:a="http://schemas.openxmlformats.org/drawingml/2006/main" uniqueId="urn:microsoft.com/office/officeart/2005/8/layout/radial2">
-  <dgm:title val=""/>
-  <dgm:desc val=""/>
-  <dgm:catLst>
-    <dgm:cat type="relationship" pri="20000"/>
-    <dgm:cat type="convert" pri="9000"/>
-  </dgm:catLst>
-  <dgm:sampData>
-    <dgm:dataModel>
-      <dgm:ptLst>
-        <dgm:pt modelId="0" type="doc"/>
-        <dgm:pt modelId="1">
-          <dgm:prSet phldr="1"/>
-        </dgm:pt>
-        <dgm:pt modelId="11">
-          <dgm:prSet phldr="1"/>
-        </dgm:pt>
-        <dgm:pt modelId="12">
-          <dgm:prSet phldr="1"/>
-        </dgm:pt>
-        <dgm:pt modelId="2">
-          <dgm:prSet phldr="1"/>
-        </dgm:pt>
-        <dgm:pt modelId="21">
-          <dgm:prSet phldr="1"/>
-        </dgm:pt>
-        <dgm:pt modelId="22">
-          <dgm:prSet phldr="1"/>
-        </dgm:pt>
-        <dgm:pt modelId="3">
-          <dgm:prSet phldr="1"/>
-        </dgm:pt>
-        <dgm:pt modelId="31">
-          <dgm:prSet phldr="1"/>
-        </dgm:pt>
-        <dgm:pt modelId="32">
-          <dgm:prSet phldr="1"/>
-        </dgm:pt>
-      </dgm:ptLst>
-      <dgm:cxnLst>
-        <dgm:cxn modelId="4" srcId="0" destId="1" srcOrd="0" destOrd="0"/>
-        <dgm:cxn modelId="5" srcId="0" destId="2" srcOrd="1" destOrd="0"/>
-        <dgm:cxn modelId="6" srcId="0" destId="3" srcOrd="2" destOrd="0"/>
-        <dgm:cxn modelId="13" srcId="1" destId="11" srcOrd="0" destOrd="0"/>
-        <dgm:cxn modelId="14" srcId="1" destId="12" srcOrd="1" destOrd="0"/>
-        <dgm:cxn modelId="23" srcId="2" destId="21" srcOrd="0" destOrd="0"/>
-        <dgm:cxn modelId="24" srcId="2" destId="22" srcOrd="1" destOrd="0"/>
-        <dgm:cxn modelId="33" srcId="3" destId="31" srcOrd="0" destOrd="0"/>
-        <dgm:cxn modelId="34" srcId="3" destId="32" srcOrd="1" destOrd="0"/>
-      </dgm:cxnLst>
-      <dgm:bg/>
-      <dgm:whole/>
-    </dgm:dataModel>
-  </dgm:sampData>
-  <dgm:styleData>
-    <dgm:dataModel>
-      <dgm:ptLst>
-        <dgm:pt modelId="0" type="doc"/>
-        <dgm:pt modelId="1"/>
-        <dgm:pt modelId="2"/>
-      </dgm:ptLst>
-      <dgm:cxnLst>
-        <dgm:cxn modelId="3" srcId="0" destId="1" srcOrd="0" destOrd="0"/>
-        <dgm:cxn modelId="4" srcId="0" destId="2" srcOrd="1" destOrd="0"/>
-      </dgm:cxnLst>
-      <dgm:bg/>
-      <dgm:whole/>
-    </dgm:dataModel>
-  </dgm:styleData>
-  <dgm:clrData>
-    <dgm:dataModel>
-      <dgm:ptLst>
-        <dgm:pt modelId="0" type="doc"/>
-        <dgm:pt modelId="1"/>
-        <dgm:pt modelId="2"/>
-        <dgm:pt modelId="3"/>
-        <dgm:pt modelId="4"/>
-      </dgm:ptLst>
-      <dgm:cxnLst>
-        <dgm:cxn modelId="5" srcId="0" destId="1" srcOrd="0" destOrd="0"/>
-        <dgm:cxn modelId="6" srcId="0" destId="2" srcOrd="1" destOrd="0"/>
-        <dgm:cxn modelId="7" srcId="0" destId="3" srcOrd="2" destOrd="0"/>
-        <dgm:cxn modelId="8" srcId="0" destId="4" srcOrd="3" destOrd="0"/>
-      </dgm:cxnLst>
-      <dgm:bg/>
-      <dgm:whole/>
-    </dgm:dataModel>
-  </dgm:clrData>
-  <dgm:layoutNode name="composite">
-    <dgm:varLst>
-      <dgm:chMax val="5"/>
-      <dgm:dir/>
-      <dgm:animLvl val="ctr"/>
-      <dgm:resizeHandles val="exact"/>
-    </dgm:varLst>
-    <dgm:alg type="composite"/>
-    <dgm:shape xmlns:r="http://schemas.openxmlformats.org/officeDocument/2006/relationships" r:blip="">
-      <dgm:adjLst/>
-    </dgm:shape>
-    <dgm:presOf/>
-    <dgm:constrLst>
-      <dgm:constr type="w" for="ch" forName="cycle" refType="w"/>
-      <dgm:constr type="h" for="ch" forName="cycle" refType="h"/>
-    </dgm:constrLst>
-    <dgm:ruleLst/>
-    <dgm:layoutNode name="cycle">
-      <dgm:choose name="Name0">
-        <dgm:if name="Name1" func="var" arg="dir" op="equ" val="norm">
-          <dgm:choose name="Name2">
-            <dgm:if name="Name3" axis="ch" ptType="node" func="cnt" op="lte" val="1">
-              <dgm:alg type="cycle">
-                <dgm:param type="stAng" val="90"/>
-                <dgm:param type="spanAng" val="360"/>
-                <dgm:param type="ctrShpMap" val="fNode"/>
-              </dgm:alg>
-            </dgm:if>
-            <dgm:if name="Name4" axis="ch" ptType="node" func="cnt" op="equ" val="2">
-              <dgm:alg type="cycle">
-                <dgm:param type="stAng" val="70"/>
-                <dgm:param type="spanAng" val="40"/>
-                <dgm:param type="ctrShpMap" val="fNode"/>
-              </dgm:alg>
-            </dgm:if>
-            <dgm:if name="Name5" axis="ch" ptType="node" func="cnt" op="equ" val="3">
-              <dgm:alg type="cycle">
-                <dgm:param type="stAng" val="60"/>
-                <dgm:param type="spanAng" val="60"/>
-                <dgm:param type="ctrShpMap" val="fNode"/>
-              </dgm:alg>
-            </dgm:if>
-            <dgm:else name="Name6">
-              <dgm:alg type="cycle">
-                <dgm:param type="stAng" val="45"/>
-                <dgm:param type="spanAng" val="90"/>
-                <dgm:param type="ctrShpMap" val="fNode"/>
-              </dgm:alg>
-            </dgm:else>
-          </dgm:choose>
-        </dgm:if>
-        <dgm:else name="Name7">
-          <dgm:choose name="Name8">
-            <dgm:if name="Name9" axis="ch" ptType="node" func="cnt" op="lte" val="1">
-              <dgm:alg type="cycle">
-                <dgm:param type="stAng" val="-90"/>
-                <dgm:param type="spanAng" val="-360"/>
-                <dgm:param type="ctrShpMap" val="fNode"/>
-              </dgm:alg>
-            </dgm:if>
-            <dgm:if name="Name10" axis="ch" ptType="node" func="cnt" op="equ" val="2">
-              <dgm:alg type="cycle">
-                <dgm:param type="stAng" val="-70"/>
-                <dgm:param type="spanAng" val="-40"/>
-                <dgm:param type="ctrShpMap" val="fNode"/>
-              </dgm:alg>
-            </dgm:if>
-            <dgm:if name="Name11" axis="ch" ptType="node" func="cnt" op="equ" val="3">
-              <dgm:alg type="cycle">
-                <dgm:param type="stAng" val="-60"/>
-                <dgm:param type="spanAng" val="-60"/>
-                <dgm:param type="ctrShpMap" val="fNode"/>
-              </dgm:alg>
-            </dgm:if>
-            <dgm:else name="Name12">
-              <dgm:alg type="cycle">
-                <dgm:param type="stAng" val="-45"/>
-                <dgm:param type="spanAng" val="-90"/>
-                <dgm:param type="ctrShpMap" val="fNode"/>
-              </dgm:alg>
-            </dgm:else>
-          </dgm:choose>
-        </dgm:else>
-      </dgm:choose>
-      <dgm:shape xmlns:r="http://schemas.openxmlformats.org/officeDocument/2006/relationships" r:blip="">
-        <dgm:adjLst/>
-      </dgm:shape>
-      <dgm:presOf/>
-      <dgm:constrLst>
-        <dgm:constr type="sp" val="20"/>
-        <dgm:constr type="w" for="ch" forName="centerShape" refType="w"/>
-        <dgm:constr type="w" for="ch" forName="node" refType="w" refFor="ch" refForName="centerShape" fact="1.5"/>
-        <dgm:constr type="sibSp" refType="w" refFor="ch" refForName="centerShape" op="equ" fact="0.08"/>
-        <dgm:constr type="primFontSz" for="des" forName="parentNode" op="equ" val="65"/>
-        <dgm:constr type="secFontSz" for="des" forName="childNode" op="equ" val="65"/>
-      </dgm:constrLst>
-      <dgm:ruleLst/>
-      <dgm:choose name="Name13">
-        <dgm:if name="Name14" axis="ch" ptType="node" hideLastTrans="0" func="cnt" op="gte" val="1">
-          <dgm:layoutNode name="centerShape" styleLbl="node0">
-            <dgm:alg type="composite"/>
-            <dgm:shape xmlns:r="http://schemas.openxmlformats.org/officeDocument/2006/relationships" r:blip="">
-              <dgm:adjLst/>
-            </dgm:shape>
-            <dgm:presOf axis="ch" ptType="node" cnt="1"/>
-            <dgm:constrLst>
-              <dgm:constr type="w" for="ch" forName="connSite" refType="w" fact="0.7"/>
-              <dgm:constr type="h" for="ch" forName="connSite" refType="w" fact="0.7"/>
-              <dgm:constr type="ctrX" for="ch" forName="connSite" refType="w" fact="0.5"/>
-              <dgm:constr type="ctrY" for="ch" forName="connSite" refType="h" fact="0.5"/>
-              <dgm:constr type="w" for="ch" forName="visible" refType="w"/>
-              <dgm:constr type="h" for="ch" forName="visible" refType="w"/>
-              <dgm:constr type="ctrX" for="ch" forName="visible" refType="w" fact="0.5"/>
-              <dgm:constr type="ctrY" for="ch" forName="visible" refType="h" fact="0.5"/>
-            </dgm:constrLst>
-            <dgm:ruleLst/>
-            <dgm:layoutNode name="connSite">
-              <dgm:alg type="sp"/>
-              <dgm:shape xmlns:r="http://schemas.openxmlformats.org/officeDocument/2006/relationships" type="ellipse" r:blip="" hideGeom="1">
-                <dgm:adjLst/>
-              </dgm:shape>
-              <dgm:presOf/>
-              <dgm:constrLst/>
-              <dgm:ruleLst/>
-            </dgm:layoutNode>
-            <dgm:layoutNode name="visible">
-              <dgm:alg type="sp"/>
-              <dgm:shape xmlns:r="http://schemas.openxmlformats.org/officeDocument/2006/relationships" type="ellipse" r:blip="" blipPhldr="1">
-                <dgm:adjLst/>
-              </dgm:shape>
-              <dgm:presOf/>
-              <dgm:constrLst/>
-              <dgm:ruleLst/>
-            </dgm:layoutNode>
-          </dgm:layoutNode>
-        </dgm:if>
-        <dgm:else name="Name15"/>
-      </dgm:choose>
-      <dgm:forEach name="Name16" axis="ch">
-        <dgm:forEach name="Name17" axis="self" ptType="node">
-          <dgm:layoutNode name="node">
-            <dgm:alg type="composite"/>
-            <dgm:shape xmlns:r="http://schemas.openxmlformats.org/officeDocument/2006/relationships" r:blip="">
-              <dgm:adjLst/>
-            </dgm:shape>
-            <dgm:presOf/>
-            <dgm:choose name="Name18">
-              <dgm:if name="Name19" func="var" arg="dir" op="equ" val="norm">
-                <dgm:constrLst>
-                  <dgm:constr type="t" for="ch" forName="parentNode"/>
-                  <dgm:constr type="l" for="ch" forName="parentNode"/>
-                  <dgm:constr type="w" for="ch" forName="parentNode" refType="w" fact="0.4"/>
-                  <dgm:constr type="h" for="ch" forName="parentNode" refType="w" refFor="ch" refForName="parentNode" op="equ"/>
-                  <dgm:constr type="ctrY" for="ch" forName="childNode" refType="h" refFor="ch" refForName="parentNode" fact="0.5"/>
-                  <dgm:constr type="l" for="ch" forName="childNode" refType="w" refFor="ch" refForName="parentNode" op="equ" fact="1.1"/>
-                  <dgm:constr type="w" for="ch" forName="childNode" refType="w" fact="0.6"/>
-                  <dgm:constr type="h" for="ch" forName="childNode" refType="h" refFor="ch" refForName="parentNode"/>
-                </dgm:constrLst>
-              </dgm:if>
-              <dgm:else name="Name20">
-                <dgm:constrLst>
-                  <dgm:constr type="t" for="ch" forName="parentNode"/>
-                  <dgm:constr type="r" for="ch" forName="parentNode" refType="w"/>
-                  <dgm:constr type="w" for="ch" forName="parentNode" refType="w" fact="0.4"/>
-                  <dgm:constr type="h" for="ch" forName="parentNode" refType="w" refFor="ch" refForName="parentNode" op="equ"/>
-                  <dgm:constr type="ctrY" for="ch" forName="childNode" refType="h" refFor="ch" refForName="parentNode" fact="0.5"/>
-                  <dgm:constr type="l" for="ch" forName="childNode"/>
-                  <dgm:constr type="w" for="ch" forName="childNode" refType="w" fact="0.6"/>
-                  <dgm:constr type="h" for="ch" forName="childNode" refType="h" refFor="ch" refForName="parentNode"/>
-                </dgm:constrLst>
-              </dgm:else>
-            </dgm:choose>
-            <dgm:ruleLst/>
-            <dgm:layoutNode name="parentNode" styleLbl="node1">
-              <dgm:varLst>
-                <dgm:chMax val="1"/>
-                <dgm:bulletEnabled val="1"/>
-              </dgm:varLst>
-              <dgm:alg type="tx"/>
-              <dgm:shape xmlns:r="http://schemas.openxmlformats.org/officeDocument/2006/relationships" type="ellipse" r:blip="">
-                <dgm:adjLst/>
-              </dgm:shape>
-              <dgm:presOf axis="self"/>
-              <dgm:constrLst>
-                <dgm:constr type="tMarg" refType="primFontSz" fact="0.05"/>
-                <dgm:constr type="bMarg" refType="primFontSz" fact="0.05"/>
-                <dgm:constr type="lMarg" refType="primFontSz" fact="0.05"/>
-                <dgm:constr type="rMarg" refType="primFontSz" fact="0.05"/>
-              </dgm:constrLst>
-              <dgm:ruleLst>
-                <dgm:rule type="primFontSz" val="5" fact="NaN" max="NaN"/>
-              </dgm:ruleLst>
-            </dgm:layoutNode>
-            <dgm:layoutNode name="childNode" styleLbl="revTx" moveWith="parentNode">
-              <dgm:varLst>
-                <dgm:bulletEnabled val="1"/>
-              </dgm:varLst>
-              <dgm:alg type="tx">
-                <dgm:param type="txAnchorVertCh" val="mid"/>
-                <dgm:param type="stBulletLvl" val="1"/>
-              </dgm:alg>
-              <dgm:choose name="Name21">
-                <dgm:if name="Name22" axis="ch" ptType="node" func="cnt" op="gte" val="1">
-                  <dgm:shape xmlns:r="http://schemas.openxmlformats.org/officeDocument/2006/relationships" type="rect" r:blip="">
-                    <dgm:adjLst/>
-                  </dgm:shape>
-                </dgm:if>
-                <dgm:else name="Name23">
-                  <dgm:shape xmlns:r="http://schemas.openxmlformats.org/officeDocument/2006/relationships" type="rect" r:blip="" hideGeom="1">
-                    <dgm:adjLst/>
-                  </dgm:shape>
-                </dgm:else>
-              </dgm:choose>
-              <dgm:presOf axis="des" ptType="node"/>
-              <dgm:constrLst>
-                <dgm:constr type="tMarg"/>
-                <dgm:constr type="bMarg"/>
-                <dgm:constr type="lMarg"/>
-                <dgm:constr type="rMarg"/>
-              </dgm:constrLst>
-              <dgm:ruleLst>
-                <dgm:rule type="secFontSz" val="5" fact="NaN" max="NaN"/>
-              </dgm:ruleLst>
-            </dgm:layoutNode>
-          </dgm:layoutNode>
-        </dgm:forEach>
-        <dgm:forEach name="Name24" axis="self" ptType="parTrans" cnt="1">
-          <dgm:layoutNode name="Name25">
-            <dgm:alg type="conn">
-              <dgm:param type="dim" val="1D"/>
-              <dgm:param type="endSty" val="noArr"/>
-              <dgm:param type="begPts" val="auto"/>
-              <dgm:param type="endPts" val="auto"/>
-              <dgm:param type="srcNode" val="connSite"/>
-              <dgm:param type="dstNode" val="parentNode"/>
-            </dgm:alg>
-            <dgm:shape xmlns:r="http://schemas.openxmlformats.org/officeDocument/2006/relationships" type="conn" r:blip="" zOrderOff="-99">
-              <dgm:adjLst/>
-            </dgm:shape>
-            <dgm:presOf axis="self"/>
-            <dgm:constrLst>
-              <dgm:constr type="connDist"/>
-              <dgm:constr type="w" val="1"/>
-              <dgm:constr type="h" val="5"/>
-              <dgm:constr type="begPad"/>
-              <dgm:constr type="endPad"/>
-            </dgm:constrLst>
-            <dgm:ruleLst/>
-          </dgm:layoutNode>
-        </dgm:forEach>
-      </dgm:forEach>
-    </dgm:layoutNode>
-  </dgm:layoutNode>
-</dgm:layoutDef>
-</file>
-
-<file path=ppt/diagrams/quickStyle1.xml><?xml version="1.0" encoding="utf-8"?>
-<dgm:styleDef xmlns:dgm="http://schemas.openxmlformats.org/drawingml/2006/diagram" xmlns:a="http://schemas.openxmlformats.org/drawingml/2006/main" uniqueId="urn:microsoft.com/office/officeart/2005/8/quickstyle/simple1">
-  <dgm:title val=""/>
-  <dgm:desc val=""/>
-  <dgm:catLst>
-    <dgm:cat type="simple" pri="10100"/>
-  </dgm:catLst>
-  <dgm:scene3d>
-    <a:camera prst="orthographicFront"/>
-    <a:lightRig rig="threePt" dir="t"/>
-  </dgm:scene3d>
-  <dgm:styleLbl name="node0">
-    <dgm:scene3d>
-      <a:camera prst="orthographicFront"/>
-      <a:lightRig rig="threePt" dir="t"/>
-    </dgm:scene3d>
-    <dgm:sp3d/>
-    <dgm:txPr/>
-    <dgm:style>
-      <a:lnRef idx="2">
-        <a:scrgbClr r="0" g="0" b="0"/>
-      </a:lnRef>
-      <a:fillRef idx="1">
-        <a:scrgbClr r="0" g="0" b="0"/>
-      </a:fillRef>
-      <a:effectRef idx="0">
-        <a:scrgbClr r="0" g="0" b="0"/>
-      </a:effectRef>
-      <a:fontRef idx="minor">
-        <a:schemeClr val="lt1"/>
-      </a:fontRef>
-    </dgm:style>
-  </dgm:styleLbl>
-  <dgm:styleLbl name="lnNode1">
-    <dgm:scene3d>
-      <a:camera prst="orthographicFront"/>
-      <a:lightRig rig="threePt" dir="t"/>
-    </dgm:scene3d>
-    <dgm:sp3d/>
-    <dgm:txPr/>
-    <dgm:style>
-      <a:lnRef idx="2">
-        <a:scrgbClr r="0" g="0" b="0"/>
-      </a:lnRef>
-      <a:fillRef idx="1">
-        <a:scrgbClr r="0" g="0" b="0"/>
-      </a:fillRef>
-      <a:effectRef idx="0">
-        <a:scrgbClr r="0" g="0" b="0"/>
-      </a:effectRef>
-      <a:fontRef idx="minor">
-        <a:schemeClr val="lt1"/>
-      </a:fontRef>
-    </dgm:style>
-  </dgm:styleLbl>
-  <dgm:styleLbl name="vennNode1">
-    <dgm:scene3d>
-      <a:camera prst="orthographicFront"/>
-      <a:lightRig rig="threePt" dir="t"/>
-    </dgm:scene3d>
-    <dgm:sp3d/>
-    <dgm:txPr/>
-    <dgm:style>
-      <a:lnRef idx="2">
-        <a:scrgbClr r="0" g="0" b="0"/>
-      </a:lnRef>
-      <a:fillRef idx="1">
-        <a:scrgbClr r="0" g="0" b="0"/>
-      </a:fillRef>
-      <a:effectRef idx="0">
-        <a:scrgbClr r="0" g="0" b="0"/>
-      </a:effectRef>
-      <a:fontRef idx="minor">
-        <a:schemeClr val="tx1"/>
-      </a:fontRef>
-    </dgm:style>
-  </dgm:styleLbl>
-  <dgm:styleLbl name="alignNode1">
-    <dgm:scene3d>
-      <a:camera prst="orthographicFront"/>
-      <a:lightRig rig="threePt" dir="t"/>
-    </dgm:scene3d>
-    <dgm:sp3d/>
-    <dgm:txPr/>
-    <dgm:style>
-      <a:lnRef idx="2">
-        <a:scrgbClr r="0" g="0" b="0"/>
-      </a:lnRef>
-      <a:fillRef idx="1">
-        <a:scrgbClr r="0" g="0" b="0"/>
-      </a:fillRef>
-      <a:effectRef idx="0">
-        <a:scrgbClr r="0" g="0" b="0"/>
-      </a:effectRef>
-      <a:fontRef idx="minor">
-        <a:schemeClr val="lt1"/>
-      </a:fontRef>
-    </dgm:style>
-  </dgm:styleLbl>
-  <dgm:styleLbl name="node1">
-    <dgm:scene3d>
-      <a:camera prst="orthographicFront"/>
-      <a:lightRig rig="threePt" dir="t"/>
-    </dgm:scene3d>
-    <dgm:sp3d/>
-    <dgm:txPr/>
-    <dgm:style>
-      <a:lnRef idx="2">
-        <a:scrgbClr r="0" g="0" b="0"/>
-      </a:lnRef>
-      <a:fillRef idx="1">
-        <a:scrgbClr r="0" g="0" b="0"/>
-      </a:fillRef>
-      <a:effectRef idx="0">
-        <a:scrgbClr r="0" g="0" b="0"/>
-      </a:effectRef>
-      <a:fontRef idx="minor">
-        <a:schemeClr val="lt1"/>
-      </a:fontRef>
-    </dgm:style>
-  </dgm:styleLbl>
-  <dgm:styleLbl name="node2">
-    <dgm:scene3d>
-      <a:camera prst="orthographicFront"/>
-      <a:lightRig rig="threePt" dir="t"/>
-    </dgm:scene3d>
-    <dgm:sp3d/>
-    <dgm:txPr/>
-    <dgm:style>
-      <a:lnRef idx="2">
-        <a:scrgbClr r="0" g="0" b="0"/>
-      </a:lnRef>
-      <a:fillRef idx="1">
-        <a:scrgbClr r="0" g="0" b="0"/>
-      </a:fillRef>
-      <a:effectRef idx="0">
-        <a:scrgbClr r="0" g="0" b="0"/>
-      </a:effectRef>
-      <a:fontRef idx="minor">
-        <a:schemeClr val="lt1"/>
-      </a:fontRef>
-    </dgm:style>
-  </dgm:styleLbl>
-  <dgm:styleLbl name="node3">
-    <dgm:scene3d>
-      <a:camera prst="orthographicFront"/>
-      <a:lightRig rig="threePt" dir="t"/>
-    </dgm:scene3d>
-    <dgm:sp3d/>
-    <dgm:txPr/>
-    <dgm:style>
-      <a:lnRef idx="2">
-        <a:scrgbClr r="0" g="0" b="0"/>
-      </a:lnRef>
-      <a:fillRef idx="1">
-        <a:scrgbClr r="0" g="0" b="0"/>
-      </a:fillRef>
-      <a:effectRef idx="0">
-        <a:scrgbClr r="0" g="0" b="0"/>
-      </a:effectRef>
-      <a:fontRef idx="minor">
-        <a:schemeClr val="lt1"/>
-      </a:fontRef>
-    </dgm:style>
-  </dgm:styleLbl>
-  <dgm:styleLbl name="node4">
-    <dgm:scene3d>
-      <a:camera prst="orthographicFront"/>
-      <a:lightRig rig="threePt" dir="t"/>
-    </dgm:scene3d>
-    <dgm:sp3d/>
-    <dgm:txPr/>
-    <dgm:style>
-      <a:lnRef idx="2">
-        <a:scrgbClr r="0" g="0" b="0"/>
-      </a:lnRef>
-      <a:fillRef idx="1">
-        <a:scrgbClr r="0" g="0" b="0"/>
-      </a:fillRef>
-      <a:effectRef idx="0">
-        <a:scrgbClr r="0" g="0" b="0"/>
-      </a:effectRef>
-      <a:fontRef idx="minor">
-        <a:schemeClr val="lt1"/>
-      </a:fontRef>
-    </dgm:style>
-  </dgm:styleLbl>
-  <dgm:styleLbl name="fgImgPlace1">
-    <dgm:scene3d>
-      <a:camera prst="orthographicFront"/>
-      <a:lightRig rig="threePt" dir="t"/>
-    </dgm:scene3d>
-    <dgm:sp3d/>
-    <dgm:txPr/>
-    <dgm:style>
-      <a:lnRef idx="2">
-        <a:scrgbClr r="0" g="0" b="0"/>
-      </a:lnRef>
-      <a:fillRef idx="1">
-        <a:scrgbClr r="0" g="0" b="0"/>
-      </a:fillRef>
-      <a:effectRef idx="0">
-        <a:scrgbClr r="0" g="0" b="0"/>
-      </a:effectRef>
-      <a:fontRef idx="minor"/>
-    </dgm:style>
-  </dgm:styleLbl>
-  <dgm:styleLbl name="alignImgPlace1">
-    <dgm:scene3d>
-      <a:camera prst="orthographicFront"/>
-      <a:lightRig rig="threePt" dir="t"/>
-    </dgm:scene3d>
-    <dgm:sp3d/>
-    <dgm:txPr/>
-    <dgm:style>
-      <a:lnRef idx="2">
-        <a:scrgbClr r="0" g="0" b="0"/>
-      </a:lnRef>
-      <a:fillRef idx="1">
-        <a:scrgbClr r="0" g="0" b="0"/>
-      </a:fillRef>
-      <a:effectRef idx="0">
-        <a:scrgbClr r="0" g="0" b="0"/>
-      </a:effectRef>
-      <a:fontRef idx="minor"/>
-    </dgm:style>
-  </dgm:styleLbl>
-  <dgm:styleLbl name="bgImgPlace1">
-    <dgm:scene3d>
-      <a:camera prst="orthographicFront"/>
-      <a:lightRig rig="threePt" dir="t"/>
-    </dgm:scene3d>
-    <dgm:sp3d/>
-    <dgm:txPr/>
-    <dgm:style>
-      <a:lnRef idx="2">
-        <a:scrgbClr r="0" g="0" b="0"/>
-      </a:lnRef>
-      <a:fillRef idx="1">
-        <a:scrgbClr r="0" g="0" b="0"/>
-      </a:fillRef>
-      <a:effectRef idx="0">
-        <a:scrgbClr r="0" g="0" b="0"/>
-      </a:effectRef>
-      <a:fontRef idx="minor"/>
-    </dgm:style>
-  </dgm:styleLbl>
-  <dgm:styleLbl name="sibTrans2D1">
-    <dgm:scene3d>
-      <a:camera prst="orthographicFront"/>
-      <a:lightRig rig="threePt" dir="t"/>
-    </dgm:scene3d>
-    <dgm:sp3d/>
-    <dgm:txPr/>
-    <dgm:style>
-      <a:lnRef idx="0">
-        <a:scrgbClr r="0" g="0" b="0"/>
-      </a:lnRef>
-      <a:fillRef idx="1">
-        <a:scrgbClr r="0" g="0" b="0"/>
-      </a:fillRef>
-      <a:effectRef idx="0">
-        <a:scrgbClr r="0" g="0" b="0"/>
-      </a:effectRef>
-      <a:fontRef idx="minor">
-        <a:schemeClr val="lt1"/>
-      </a:fontRef>
-    </dgm:style>
-  </dgm:styleLbl>
-  <dgm:styleLbl name="fgSibTrans2D1">
-    <dgm:scene3d>
-      <a:camera prst="orthographicFront"/>
-      <a:lightRig rig="threePt" dir="t"/>
-    </dgm:scene3d>
-    <dgm:sp3d/>
-    <dgm:txPr/>
-    <dgm:style>
-      <a:lnRef idx="0">
-        <a:scrgbClr r="0" g="0" b="0"/>
-      </a:lnRef>
-      <a:fillRef idx="1">
-        <a:scrgbClr r="0" g="0" b="0"/>
-      </a:fillRef>
-      <a:effectRef idx="0">
-        <a:scrgbClr r="0" g="0" b="0"/>
-      </a:effectRef>
-      <a:fontRef idx="minor">
-        <a:schemeClr val="lt1"/>
-      </a:fontRef>
-    </dgm:style>
-  </dgm:styleLbl>
-  <dgm:styleLbl name="bgSibTrans2D1">
-    <dgm:scene3d>
-      <a:camera prst="orthographicFront"/>
-      <a:lightRig rig="threePt" dir="t"/>
-    </dgm:scene3d>
-    <dgm:sp3d/>
-    <dgm:txPr/>
-    <dgm:style>
-      <a:lnRef idx="0">
-        <a:scrgbClr r="0" g="0" b="0"/>
-      </a:lnRef>
-      <a:fillRef idx="1">
-        <a:scrgbClr r="0" g="0" b="0"/>
-      </a:fillRef>
-      <a:effectRef idx="0">
-        <a:scrgbClr r="0" g="0" b="0"/>
-      </a:effectRef>
-      <a:fontRef idx="minor">
-        <a:schemeClr val="lt1"/>
-      </a:fontRef>
-    </dgm:style>
-  </dgm:styleLbl>
-  <dgm:styleLbl name="sibTrans1D1">
-    <dgm:scene3d>
-      <a:camera prst="orthographicFront"/>
-      <a:lightRig rig="threePt" dir="t"/>
-    </dgm:scene3d>
-    <dgm:sp3d/>
-    <dgm:txPr/>
-    <dgm:style>
-      <a:lnRef idx="1">
-        <a:scrgbClr r="0" g="0" b="0"/>
-      </a:lnRef>
-      <a:fillRef idx="0">
-        <a:scrgbClr r="0" g="0" b="0"/>
-      </a:fillRef>
-      <a:effectRef idx="0">
-        <a:scrgbClr r="0" g="0" b="0"/>
-      </a:effectRef>
-      <a:fontRef idx="minor"/>
-    </dgm:style>
-  </dgm:styleLbl>
-  <dgm:styleLbl name="callout">
-    <dgm:scene3d>
-      <a:camera prst="orthographicFront"/>
-      <a:lightRig rig="threePt" dir="t"/>
-    </dgm:scene3d>
-    <dgm:sp3d/>
-    <dgm:txPr/>
-    <dgm:style>
-      <a:lnRef idx="2">
-        <a:scrgbClr r="0" g="0" b="0"/>
-      </a:lnRef>
-      <a:fillRef idx="1">
-        <a:scrgbClr r="0" g="0" b="0"/>
-      </a:fillRef>
-      <a:effectRef idx="0">
-        <a:scrgbClr r="0" g="0" b="0"/>
-      </a:effectRef>
-      <a:fontRef idx="minor"/>
-    </dgm:style>
-  </dgm:styleLbl>
-  <dgm:styleLbl name="asst0">
-    <dgm:scene3d>
-      <a:camera prst="orthographicFront"/>
-      <a:lightRig rig="threePt" dir="t"/>
-    </dgm:scene3d>
-    <dgm:sp3d/>
-    <dgm:txPr/>
-    <dgm:style>
-      <a:lnRef idx="2">
-        <a:scrgbClr r="0" g="0" b="0"/>
-      </a:lnRef>
-      <a:fillRef idx="1">
-        <a:scrgbClr r="0" g="0" b="0"/>
-      </a:fillRef>
-      <a:effectRef idx="0">
-        <a:scrgbClr r="0" g="0" b="0"/>
-      </a:effectRef>
-      <a:fontRef idx="minor">
-        <a:schemeClr val="lt1"/>
-      </a:fontRef>
-    </dgm:style>
-  </dgm:styleLbl>
-  <dgm:styleLbl name="asst1">
-    <dgm:scene3d>
-      <a:camera prst="orthographicFront"/>
-      <a:lightRig rig="threePt" dir="t"/>
-    </dgm:scene3d>
-    <dgm:sp3d/>
-    <dgm:txPr/>
-    <dgm:style>
-      <a:lnRef idx="2">
-        <a:scrgbClr r="0" g="0" b="0"/>
-      </a:lnRef>
-      <a:fillRef idx="1">
-        <a:scrgbClr r="0" g="0" b="0"/>
-      </a:fillRef>
-      <a:effectRef idx="0">
-        <a:scrgbClr r="0" g="0" b="0"/>
-      </a:effectRef>
-      <a:fontRef idx="minor">
-        <a:schemeClr val="lt1"/>
-      </a:fontRef>
-    </dgm:style>
-  </dgm:styleLbl>
-  <dgm:styleLbl name="asst2">
-    <dgm:scene3d>
-      <a:camera prst="orthographicFront"/>
-      <a:lightRig rig="threePt" dir="t"/>
-    </dgm:scene3d>
-    <dgm:sp3d/>
-    <dgm:txPr/>
-    <dgm:style>
-      <a:lnRef idx="2">
-        <a:scrgbClr r="0" g="0" b="0"/>
-      </a:lnRef>
-      <a:fillRef idx="1">
-        <a:scrgbClr r="0" g="0" b="0"/>
-      </a:fillRef>
-      <a:effectRef idx="0">
-        <a:scrgbClr r="0" g="0" b="0"/>
-      </a:effectRef>
-      <a:fontRef idx="minor">
-        <a:schemeClr val="lt1"/>
-      </a:fontRef>
-    </dgm:style>
-  </dgm:styleLbl>
-  <dgm:styleLbl name="asst3">
-    <dgm:scene3d>
-      <a:camera prst="orthographicFront"/>
-      <a:lightRig rig="threePt" dir="t"/>
-    </dgm:scene3d>
-    <dgm:sp3d/>
-    <dgm:txPr/>
-    <dgm:style>
-      <a:lnRef idx="2">
-        <a:scrgbClr r="0" g="0" b="0"/>
-      </a:lnRef>
-      <a:fillRef idx="1">
-        <a:scrgbClr r="0" g="0" b="0"/>
-      </a:fillRef>
-      <a:effectRef idx="0">
-        <a:scrgbClr r="0" g="0" b="0"/>
-      </a:effectRef>
-      <a:fontRef idx="minor">
-        <a:schemeClr val="lt1"/>
-      </a:fontRef>
-    </dgm:style>
-  </dgm:styleLbl>
-  <dgm:styleLbl name="asst4">
-    <dgm:scene3d>
-      <a:camera prst="orthographicFront"/>
-      <a:lightRig rig="threePt" dir="t"/>
-    </dgm:scene3d>
-    <dgm:sp3d/>
-    <dgm:txPr/>
-    <dgm:style>
-      <a:lnRef idx="2">
-        <a:scrgbClr r="0" g="0" b="0"/>
-      </a:lnRef>
-      <a:fillRef idx="1">
-        <a:scrgbClr r="0" g="0" b="0"/>
-      </a:fillRef>
-      <a:effectRef idx="0">
-        <a:scrgbClr r="0" g="0" b="0"/>
-      </a:effectRef>
-      <a:fontRef idx="minor">
-        <a:schemeClr val="lt1"/>
-      </a:fontRef>
-    </dgm:style>
-  </dgm:styleLbl>
-  <dgm:styleLbl name="parChTrans2D1">
-    <dgm:scene3d>
-      <a:camera prst="orthographicFront"/>
-      <a:lightRig rig="threePt" dir="t"/>
-    </dgm:scene3d>
-    <dgm:sp3d/>
-    <dgm:txPr/>
-    <dgm:style>
-      <a:lnRef idx="2">
-        <a:scrgbClr r="0" g="0" b="0"/>
-      </a:lnRef>
-      <a:fillRef idx="1">
-        <a:scrgbClr r="0" g="0" b="0"/>
-      </a:fillRef>
-      <a:effectRef idx="0">
-        <a:scrgbClr r="0" g="0" b="0"/>
-      </a:effectRef>
-      <a:fontRef idx="minor">
-        <a:schemeClr val="lt1"/>
-      </a:fontRef>
-    </dgm:style>
-  </dgm:styleLbl>
-  <dgm:styleLbl name="parChTrans2D2">
-    <dgm:scene3d>
-      <a:camera prst="orthographicFront"/>
-      <a:lightRig rig="threePt" dir="t"/>
-    </dgm:scene3d>
-    <dgm:sp3d/>
-    <dgm:txPr/>
-    <dgm:style>
-      <a:lnRef idx="2">
-        <a:scrgbClr r="0" g="0" b="0"/>
-      </a:lnRef>
-      <a:fillRef idx="1">
-        <a:scrgbClr r="0" g="0" b="0"/>
-      </a:fillRef>
-      <a:effectRef idx="0">
-        <a:scrgbClr r="0" g="0" b="0"/>
-      </a:effectRef>
-      <a:fontRef idx="minor">
-        <a:schemeClr val="lt1"/>
-      </a:fontRef>
-    </dgm:style>
-  </dgm:styleLbl>
-  <dgm:styleLbl name="parChTrans2D3">
-    <dgm:scene3d>
-      <a:camera prst="orthographicFront"/>
-      <a:lightRig rig="threePt" dir="t"/>
-    </dgm:scene3d>
-    <dgm:sp3d/>
-    <dgm:txPr/>
-    <dgm:style>
-      <a:lnRef idx="2">
-        <a:scrgbClr r="0" g="0" b="0"/>
-      </a:lnRef>
-      <a:fillRef idx="1">
-        <a:scrgbClr r="0" g="0" b="0"/>
-      </a:fillRef>
-      <a:effectRef idx="0">
-        <a:scrgbClr r="0" g="0" b="0"/>
-      </a:effectRef>
-      <a:fontRef idx="minor">
-        <a:schemeClr val="lt1"/>
-      </a:fontRef>
-    </dgm:style>
-  </dgm:styleLbl>
-  <dgm:styleLbl name="parChTrans2D4">
-    <dgm:scene3d>
-      <a:camera prst="orthographicFront"/>
-      <a:lightRig rig="threePt" dir="t"/>
-    </dgm:scene3d>
-    <dgm:sp3d/>
-    <dgm:txPr/>
-    <dgm:style>
-      <a:lnRef idx="2">
-        <a:scrgbClr r="0" g="0" b="0"/>
-      </a:lnRef>
-      <a:fillRef idx="1">
-        <a:scrgbClr r="0" g="0" b="0"/>
-      </a:fillRef>
-      <a:effectRef idx="0">
-        <a:scrgbClr r="0" g="0" b="0"/>
-      </a:effectRef>
-      <a:fontRef idx="minor">
-        <a:schemeClr val="lt1"/>
-      </a:fontRef>
-    </dgm:style>
-  </dgm:styleLbl>
-  <dgm:styleLbl name="parChTrans1D1">
-    <dgm:scene3d>
-      <a:camera prst="orthographicFront"/>
-      <a:lightRig rig="threePt" dir="t"/>
-    </dgm:scene3d>
-    <dgm:sp3d/>
-    <dgm:txPr/>
-    <dgm:style>
-      <a:lnRef idx="2">
-        <a:scrgbClr r="0" g="0" b="0"/>
-      </a:lnRef>
-      <a:fillRef idx="0">
-        <a:scrgbClr r="0" g="0" b="0"/>
-      </a:fillRef>
-      <a:effectRef idx="0">
-        <a:scrgbClr r="0" g="0" b="0"/>
-      </a:effectRef>
-      <a:fontRef idx="minor"/>
-    </dgm:style>
-  </dgm:styleLbl>
-  <dgm:styleLbl name="parChTrans1D2">
-    <dgm:scene3d>
-      <a:camera prst="orthographicFront"/>
-      <a:lightRig rig="threePt" dir="t"/>
-    </dgm:scene3d>
-    <dgm:sp3d/>
-    <dgm:txPr/>
-    <dgm:style>
-      <a:lnRef idx="2">
-        <a:scrgbClr r="0" g="0" b="0"/>
-      </a:lnRef>
-      <a:fillRef idx="0">
-        <a:scrgbClr r="0" g="0" b="0"/>
-      </a:fillRef>
-      <a:effectRef idx="0">
-        <a:scrgbClr r="0" g="0" b="0"/>
-      </a:effectRef>
-      <a:fontRef idx="minor"/>
-    </dgm:style>
-  </dgm:styleLbl>
-  <dgm:styleLbl name="parChTrans1D3">
-    <dgm:scene3d>
-      <a:camera prst="orthographicFront"/>
-      <a:lightRig rig="threePt" dir="t"/>
-    </dgm:scene3d>
-    <dgm:sp3d/>
-    <dgm:txPr/>
-    <dgm:style>
-      <a:lnRef idx="2">
-        <a:scrgbClr r="0" g="0" b="0"/>
-      </a:lnRef>
-      <a:fillRef idx="0">
-        <a:scrgbClr r="0" g="0" b="0"/>
-      </a:fillRef>
-      <a:effectRef idx="0">
-        <a:scrgbClr r="0" g="0" b="0"/>
-      </a:effectRef>
-      <a:fontRef idx="minor"/>
-    </dgm:style>
-  </dgm:styleLbl>
-  <dgm:styleLbl name="parChTrans1D4">
-    <dgm:scene3d>
-      <a:camera prst="orthographicFront"/>
-      <a:lightRig rig="threePt" dir="t"/>
-    </dgm:scene3d>
-    <dgm:sp3d/>
-    <dgm:txPr/>
-    <dgm:style>
-      <a:lnRef idx="2">
-        <a:scrgbClr r="0" g="0" b="0"/>
-      </a:lnRef>
-      <a:fillRef idx="0">
-        <a:scrgbClr r="0" g="0" b="0"/>
-      </a:fillRef>
-      <a:effectRef idx="0">
-        <a:scrgbClr r="0" g="0" b="0"/>
-      </a:effectRef>
-      <a:fontRef idx="minor"/>
-    </dgm:style>
-  </dgm:styleLbl>
-  <dgm:styleLbl name="fgAcc1">
-    <dgm:scene3d>
-      <a:camera prst="orthographicFront"/>
-      <a:lightRig rig="threePt" dir="t"/>
-    </dgm:scene3d>
-    <dgm:sp3d/>
-    <dgm:txPr/>
-    <dgm:style>
-      <a:lnRef idx="2">
-        <a:scrgbClr r="0" g="0" b="0"/>
-      </a:lnRef>
-      <a:fillRef idx="1">
-        <a:scrgbClr r="0" g="0" b="0"/>
-      </a:fillRef>
-      <a:effectRef idx="0">
-        <a:scrgbClr r="0" g="0" b="0"/>
-      </a:effectRef>
-      <a:fontRef idx="minor"/>
-    </dgm:style>
-  </dgm:styleLbl>
-  <dgm:styleLbl name="conFgAcc1">
-    <dgm:scene3d>
-      <a:camera prst="orthographicFront"/>
-      <a:lightRig rig="threePt" dir="t"/>
-    </dgm:scene3d>
-    <dgm:sp3d/>
-    <dgm:txPr/>
-    <dgm:style>
-      <a:lnRef idx="2">
-        <a:scrgbClr r="0" g="0" b="0"/>
-      </a:lnRef>
-      <a:fillRef idx="1">
-        <a:scrgbClr r="0" g="0" b="0"/>
-      </a:fillRef>
-      <a:effectRef idx="0">
-        <a:scrgbClr r="0" g="0" b="0"/>
-      </a:effectRef>
-      <a:fontRef idx="minor"/>
-    </dgm:style>
-  </dgm:styleLbl>
-  <dgm:styleLbl name="alignAcc1">
-    <dgm:scene3d>
-      <a:camera prst="orthographicFront"/>
-      <a:lightRig rig="threePt" dir="t"/>
-    </dgm:scene3d>
-    <dgm:sp3d/>
-    <dgm:txPr/>
-    <dgm:style>
-      <a:lnRef idx="2">
-        <a:scrgbClr r="0" g="0" b="0"/>
-      </a:lnRef>
-      <a:fillRef idx="1">
-        <a:scrgbClr r="0" g="0" b="0"/>
-      </a:fillRef>
-      <a:effectRef idx="0">
-        <a:scrgbClr r="0" g="0" b="0"/>
-      </a:effectRef>
-      <a:fontRef idx="minor"/>
-    </dgm:style>
-  </dgm:styleLbl>
-  <dgm:styleLbl name="trAlignAcc1">
-    <dgm:scene3d>
-      <a:camera prst="orthographicFront"/>
-      <a:lightRig rig="threePt" dir="t"/>
-    </dgm:scene3d>
-    <dgm:sp3d/>
-    <dgm:txPr/>
-    <dgm:style>
-      <a:lnRef idx="1">
-        <a:scrgbClr r="0" g="0" b="0"/>
-      </a:lnRef>
-      <a:fillRef idx="1">
-        <a:scrgbClr r="0" g="0" b="0"/>
-      </a:fillRef>
-      <a:effectRef idx="0">
-        <a:scrgbClr r="0" g="0" b="0"/>
-      </a:effectRef>
-      <a:fontRef idx="minor"/>
-    </dgm:style>
-  </dgm:styleLbl>
-  <dgm:styleLbl name="bgAcc1">
-    <dgm:scene3d>
-      <a:camera prst="orthographicFront"/>
-      <a:lightRig rig="threePt" dir="t"/>
-    </dgm:scene3d>
-    <dgm:sp3d/>
-    <dgm:txPr/>
-    <dgm:style>
-      <a:lnRef idx="2">
-        <a:scrgbClr r="0" g="0" b="0"/>
-      </a:lnRef>
-      <a:fillRef idx="1">
-        <a:scrgbClr r="0" g="0" b="0"/>
-      </a:fillRef>
-      <a:effectRef idx="0">
-        <a:scrgbClr r="0" g="0" b="0"/>
-      </a:effectRef>
-      <a:fontRef idx="minor"/>
-    </dgm:style>
-  </dgm:styleLbl>
-  <dgm:styleLbl name="solidFgAcc1">
-    <dgm:scene3d>
-      <a:camera prst="orthographicFront"/>
-      <a:lightRig rig="threePt" dir="t"/>
-    </dgm:scene3d>
-    <dgm:sp3d/>
-    <dgm:txPr/>
-    <dgm:style>
-      <a:lnRef idx="2">
-        <a:scrgbClr r="0" g="0" b="0"/>
-      </a:lnRef>
-      <a:fillRef idx="1">
-        <a:scrgbClr r="0" g="0" b="0"/>
-      </a:fillRef>
-      <a:effectRef idx="0">
-        <a:scrgbClr r="0" g="0" b="0"/>
-      </a:effectRef>
-      <a:fontRef idx="minor"/>
-    </dgm:style>
-  </dgm:styleLbl>
-  <dgm:styleLbl name="solidAlignAcc1">
-    <dgm:scene3d>
-      <a:camera prst="orthographicFront"/>
-      <a:lightRig rig="threePt" dir="t"/>
-    </dgm:scene3d>
-    <dgm:sp3d/>
-    <dgm:txPr/>
-    <dgm:style>
-      <a:lnRef idx="2">
-        <a:scrgbClr r="0" g="0" b="0"/>
-      </a:lnRef>
-      <a:fillRef idx="1">
-        <a:scrgbClr r="0" g="0" b="0"/>
-      </a:fillRef>
-      <a:effectRef idx="0">
-        <a:scrgbClr r="0" g="0" b="0"/>
-      </a:effectRef>
-      <a:fontRef idx="minor"/>
-    </dgm:style>
-  </dgm:styleLbl>
-  <dgm:styleLbl name="solidBgAcc1">
-    <dgm:scene3d>
-      <a:camera prst="orthographicFront"/>
-      <a:lightRig rig="threePt" dir="t"/>
-    </dgm:scene3d>
-    <dgm:sp3d/>
-    <dgm:txPr/>
-    <dgm:style>
-      <a:lnRef idx="2">
-        <a:scrgbClr r="0" g="0" b="0"/>
-      </a:lnRef>
-      <a:fillRef idx="1">
-        <a:scrgbClr r="0" g="0" b="0"/>
-      </a:fillRef>
-      <a:effectRef idx="0">
-        <a:scrgbClr r="0" g="0" b="0"/>
-      </a:effectRef>
-      <a:fontRef idx="minor"/>
-    </dgm:style>
-  </dgm:styleLbl>
-  <dgm:styleLbl name="fgAccFollowNode1">
-    <dgm:scene3d>
-      <a:camera prst="orthographicFront"/>
-      <a:lightRig rig="threePt" dir="t"/>
-    </dgm:scene3d>
-    <dgm:sp3d/>
-    <dgm:txPr/>
-    <dgm:style>
-      <a:lnRef idx="2">
-        <a:scrgbClr r="0" g="0" b="0"/>
-      </a:lnRef>
-      <a:fillRef idx="1">
-        <a:scrgbClr r="0" g="0" b="0"/>
-      </a:fillRef>
-      <a:effectRef idx="0">
-        <a:scrgbClr r="0" g="0" b="0"/>
-      </a:effectRef>
-      <a:fontRef idx="minor"/>
-    </dgm:style>
-  </dgm:styleLbl>
-  <dgm:styleLbl name="alignAccFollowNode1">
-    <dgm:scene3d>
-      <a:camera prst="orthographicFront"/>
-      <a:lightRig rig="threePt" dir="t"/>
-    </dgm:scene3d>
-    <dgm:sp3d/>
-    <dgm:txPr/>
-    <dgm:style>
-      <a:lnRef idx="2">
-        <a:scrgbClr r="0" g="0" b="0"/>
-      </a:lnRef>
-      <a:fillRef idx="1">
-        <a:scrgbClr r="0" g="0" b="0"/>
-      </a:fillRef>
-      <a:effectRef idx="0">
-        <a:scrgbClr r="0" g="0" b="0"/>
-      </a:effectRef>
-      <a:fontRef idx="minor"/>
-    </dgm:style>
-  </dgm:styleLbl>
-  <dgm:styleLbl name="bgAccFollowNode1">
-    <dgm:scene3d>
-      <a:camera prst="orthographicFront"/>
-      <a:lightRig rig="threePt" dir="t"/>
-    </dgm:scene3d>
-    <dgm:sp3d/>
-    <dgm:txPr/>
-    <dgm:style>
-      <a:lnRef idx="2">
-        <a:scrgbClr r="0" g="0" b="0"/>
-      </a:lnRef>
-      <a:fillRef idx="1">
-        <a:scrgbClr r="0" g="0" b="0"/>
-      </a:fillRef>
-      <a:effectRef idx="0">
-        <a:scrgbClr r="0" g="0" b="0"/>
-      </a:effectRef>
-      <a:fontRef idx="minor"/>
-    </dgm:style>
-  </dgm:styleLbl>
-  <dgm:styleLbl name="fgAcc0">
-    <dgm:scene3d>
-      <a:camera prst="orthographicFront"/>
-      <a:lightRig rig="threePt" dir="t"/>
-    </dgm:scene3d>
-    <dgm:sp3d/>
-    <dgm:txPr/>
-    <dgm:style>
-      <a:lnRef idx="2">
-        <a:scrgbClr r="0" g="0" b="0"/>
-      </a:lnRef>
-      <a:fillRef idx="1">
-        <a:scrgbClr r="0" g="0" b="0"/>
-      </a:fillRef>
-      <a:effectRef idx="0">
-        <a:scrgbClr r="0" g="0" b="0"/>
-      </a:effectRef>
-      <a:fontRef idx="minor"/>
-    </dgm:style>
-  </dgm:styleLbl>
-  <dgm:styleLbl name="fgAcc2">
-    <dgm:scene3d>
-      <a:camera prst="orthographicFront"/>
-      <a:lightRig rig="threePt" dir="t"/>
-    </dgm:scene3d>
-    <dgm:sp3d/>
-    <dgm:txPr/>
-    <dgm:style>
-      <a:lnRef idx="2">
-        <a:scrgbClr r="0" g="0" b="0"/>
-      </a:lnRef>
-      <a:fillRef idx="1">
-        <a:scrgbClr r="0" g="0" b="0"/>
-      </a:fillRef>
-      <a:effectRef idx="0">
-        <a:scrgbClr r="0" g="0" b="0"/>
-      </a:effectRef>
-      <a:fontRef idx="minor"/>
-    </dgm:style>
-  </dgm:styleLbl>
-  <dgm:styleLbl name="fgAcc3">
-    <dgm:scene3d>
-      <a:camera prst="orthographicFront"/>
-      <a:lightRig rig="threePt" dir="t"/>
-    </dgm:scene3d>
-    <dgm:sp3d/>
-    <dgm:txPr/>
-    <dgm:style>
-      <a:lnRef idx="2">
-        <a:scrgbClr r="0" g="0" b="0"/>
-      </a:lnRef>
-      <a:fillRef idx="1">
-        <a:scrgbClr r="0" g="0" b="0"/>
-      </a:fillRef>
-      <a:effectRef idx="0">
-        <a:scrgbClr r="0" g="0" b="0"/>
-      </a:effectRef>
-      <a:fontRef idx="minor"/>
-    </dgm:style>
-  </dgm:styleLbl>
-  <dgm:styleLbl name="fgAcc4">
-    <dgm:scene3d>
-      <a:camera prst="orthographicFront"/>
-      <a:lightRig rig="threePt" dir="t"/>
-    </dgm:scene3d>
-    <dgm:sp3d/>
-    <dgm:txPr/>
-    <dgm:style>
-      <a:lnRef idx="2">
-        <a:scrgbClr r="0" g="0" b="0"/>
-      </a:lnRef>
-      <a:fillRef idx="1">
-        <a:scrgbClr r="0" g="0" b="0"/>
-      </a:fillRef>
-      <a:effectRef idx="0">
-        <a:scrgbClr r="0" g="0" b="0"/>
-      </a:effectRef>
-      <a:fontRef idx="minor"/>
-    </dgm:style>
-  </dgm:styleLbl>
-  <dgm:styleLbl name="bgShp">
-    <dgm:scene3d>
-      <a:camera prst="orthographicFront"/>
-      <a:lightRig rig="threePt" dir="t"/>
-    </dgm:scene3d>
-    <dgm:sp3d/>
-    <dgm:txPr/>
-    <dgm:style>
-      <a:lnRef idx="0">
-        <a:scrgbClr r="0" g="0" b="0"/>
-      </a:lnRef>
-      <a:fillRef idx="1">
-        <a:scrgbClr r="0" g="0" b="0"/>
-      </a:fillRef>
-      <a:effectRef idx="0">
-        <a:scrgbClr r="0" g="0" b="0"/>
-      </a:effectRef>
-      <a:fontRef idx="minor"/>
-    </dgm:style>
-  </dgm:styleLbl>
-  <dgm:styleLbl name="dkBgShp">
-    <dgm:scene3d>
-      <a:camera prst="orthographicFront"/>
-      <a:lightRig rig="threePt" dir="t"/>
-    </dgm:scene3d>
-    <dgm:sp3d/>
-    <dgm:txPr/>
-    <dgm:style>
-      <a:lnRef idx="0">
-        <a:scrgbClr r="0" g="0" b="0"/>
-      </a:lnRef>
-      <a:fillRef idx="1">
-        <a:scrgbClr r="0" g="0" b="0"/>
-      </a:fillRef>
-      <a:effectRef idx="0">
-        <a:scrgbClr r="0" g="0" b="0"/>
-      </a:effectRef>
-      <a:fontRef idx="minor"/>
-    </dgm:style>
-  </dgm:styleLbl>
-  <dgm:styleLbl name="trBgShp">
-    <dgm:scene3d>
-      <a:camera prst="orthographicFront"/>
-      <a:lightRig rig="threePt" dir="t"/>
-    </dgm:scene3d>
-    <dgm:sp3d/>
-    <dgm:txPr/>
-    <dgm:style>
-      <a:lnRef idx="0">
-        <a:scrgbClr r="0" g="0" b="0"/>
-      </a:lnRef>
-      <a:fillRef idx="1">
-        <a:scrgbClr r="0" g="0" b="0"/>
-      </a:fillRef>
-      <a:effectRef idx="0">
-        <a:scrgbClr r="0" g="0" b="0"/>
-      </a:effectRef>
-      <a:fontRef idx="minor"/>
-    </dgm:style>
-  </dgm:styleLbl>
-  <dgm:styleLbl name="fgShp">
-    <dgm:scene3d>
-      <a:camera prst="orthographicFront"/>
-      <a:lightRig rig="threePt" dir="t"/>
-    </dgm:scene3d>
-    <dgm:sp3d/>
-    <dgm:txPr/>
-    <dgm:style>
-      <a:lnRef idx="2">
-        <a:scrgbClr r="0" g="0" b="0"/>
-      </a:lnRef>
-      <a:fillRef idx="1">
-        <a:scrgbClr r="0" g="0" b="0"/>
-      </a:fillRef>
-      <a:effectRef idx="0">
-        <a:scrgbClr r="0" g="0" b="0"/>
-      </a:effectRef>
-      <a:fontRef idx="minor"/>
-    </dgm:style>
-  </dgm:styleLbl>
-  <dgm:styleLbl name="revTx">
-    <dgm:scene3d>
-      <a:camera prst="orthographicFront"/>
-      <a:lightRig rig="threePt" dir="t"/>
-    </dgm:scene3d>
-    <dgm:sp3d/>
-    <dgm:txPr/>
-    <dgm:style>
-      <a:lnRef idx="0">
-        <a:scrgbClr r="0" g="0" b="0"/>
-      </a:lnRef>
-      <a:fillRef idx="0">
-        <a:scrgbClr r="0" g="0" b="0"/>
-      </a:fillRef>
-      <a:effectRef idx="0">
-        <a:scrgbClr r="0" g="0" b="0"/>
-      </a:effectRef>
-      <a:fontRef idx="minor"/>
-    </dgm:style>
-  </dgm:styleLbl>
-</dgm:styleDef>
-</file>
-
 <file path=ppt/notesMasters/notesMaster1.xml><?xml version="1.0" encoding="utf-8"?>
 <p:notesMaster xmlns:a="http://schemas.openxmlformats.org/drawingml/2006/main" xmlns:r="http://schemas.openxmlformats.org/officeDocument/2006/relationships" xmlns:p="http://schemas.openxmlformats.org/presentationml/2006/main">
   <p:cSld>
@@ -3387,7 +541,7 @@
           <a:p>
             <a:r>
               <a:rPr lang="en-US" dirty="0"/>
-              <a:t>The goal of the project is to compare recipes from two popular recipe websites, Spoonacular and </a:t>
+              <a:t>The goal, as per the project proposal, is to compare recipes from two popular recipe websites, Spoonacular and </a:t>
             </a:r>
             <a:r>
               <a:rPr lang="en-US" dirty="0" err="1"/>
@@ -3395,7 +549,7 @@
             </a:r>
             <a:r>
               <a:rPr lang="en-US" dirty="0"/>
-              <a:t>, and identify “healthy” recipes using two market-implemented measures: Nutri-Scores and Weight Watchers Smart Points.</a:t>
+              <a:t>, and identify “healthy” recipes using two market-implemented measures: Nutri-Scores and Weight Watchers Smart Points. </a:t>
             </a:r>
           </a:p>
         </p:txBody>
@@ -3517,7 +671,27 @@
             </a:r>
             <a:r>
               <a:rPr lang="en-US" dirty="0"/>
-              <a:t>, and identify “healthy” recipes using two market-implemented measures: Nutri-Scores and Weight Watchers Smart Points.</a:t>
+              <a:t>, and identify “healthy” recipes using two market-implemented measures: Nutri-Scores and Weight Watchers Smart Points. In terms of the outcome, the primary dataset we used was </a:t>
+            </a:r>
+            <a:r>
+              <a:rPr lang="en-US" dirty="0" err="1"/>
+              <a:t>Food.com</a:t>
+            </a:r>
+            <a:r>
+              <a:rPr lang="en-US" dirty="0"/>
+              <a:t> (we’ll talk through the Spoonacular API briefly) and the primary measure of recipe healthiness as “Weight Watchers”, and for context, the lower the points are the healthier the recipe is.</a:t>
+            </a:r>
+          </a:p>
+          <a:p>
+            <a:r>
+              <a:rPr lang="en-US" dirty="0"/>
+              <a:t>- Nutri-Scores: API was limited to 500 requests per day, and ran out of time.</a:t>
+            </a:r>
+          </a:p>
+          <a:p>
+            <a:r>
+              <a:rPr lang="en-US" dirty="0"/>
+              <a:t>- Spoonacular API: even after about 20 requests (limited to 150 per day), most rows did not have the minimum data required. Reducing the dataset to a single meal type reduced the dataset from 1600 to 180.</a:t>
             </a:r>
           </a:p>
         </p:txBody>
@@ -10949,15 +8123,7 @@
             <a:pPr lvl="1"/>
             <a:r>
               <a:rPr lang="en-US" dirty="0"/>
-              <a:t>What meal type (breakfast</a:t>
-            </a:r>
-            <a:r>
-              <a:rPr lang="en-US"/>
-              <a:t>, lunch, or dinner</a:t>
-            </a:r>
-            <a:r>
-              <a:rPr lang="en-US" dirty="0"/>
-              <a:t>) is the healthiest?</a:t>
+              <a:t>What meal type (breakfast, lunch, or dinner) is the healthiest?</a:t>
             </a:r>
           </a:p>
           <a:p>
@@ -11178,10 +8344,10 @@
       </p:sp>
       <p:graphicFrame>
         <p:nvGraphicFramePr>
-          <p:cNvPr id="7" name="Content Placeholder 6">
+          <p:cNvPr id="21" name="Table 21">
             <a:extLst>
               <a:ext uri="{FF2B5EF4-FFF2-40B4-BE49-F238E27FC236}">
-                <a16:creationId xmlns:a16="http://schemas.microsoft.com/office/drawing/2014/main" id="{E4E4CC01-F5FB-C2B2-F022-34CE73B81E6C}"/>
+                <a16:creationId xmlns:a16="http://schemas.microsoft.com/office/drawing/2014/main" id="{19A4FD8A-6EC6-E086-C701-DDF1DF8779FF}"/>
               </a:ext>
             </a:extLst>
           </p:cNvPr>
@@ -11192,56 +8358,517 @@
             <p:ph idx="1"/>
             <p:extLst>
               <p:ext uri="{D42A27DB-BD31-4B8C-83A1-F6EECF244321}">
-                <p14:modId xmlns:p14="http://schemas.microsoft.com/office/powerpoint/2010/main" val="2713455787"/>
+                <p14:modId xmlns:p14="http://schemas.microsoft.com/office/powerpoint/2010/main" val="3744473890"/>
               </p:ext>
             </p:extLst>
           </p:nvPr>
         </p:nvGraphicFramePr>
         <p:xfrm>
-          <a:off x="677863" y="2160588"/>
-          <a:ext cx="8596312" cy="3881437"/>
+          <a:off x="2917998" y="1467168"/>
+          <a:ext cx="6648008" cy="4572000"/>
         </p:xfrm>
         <a:graphic>
-          <a:graphicData uri="http://schemas.openxmlformats.org/drawingml/2006/diagram">
-            <dgm:relIds xmlns:dgm="http://schemas.openxmlformats.org/drawingml/2006/diagram" xmlns:r="http://schemas.openxmlformats.org/officeDocument/2006/relationships" r:dm="rId4" r:lo="rId5" r:qs="rId6" r:cs="rId7"/>
+          <a:graphicData uri="http://schemas.openxmlformats.org/drawingml/2006/table">
+            <a:tbl>
+              <a:tblPr firstRow="1" bandRow="1">
+                <a:tableStyleId>{5C22544A-7EE6-4342-B048-85BDC9FD1C3A}</a:tableStyleId>
+              </a:tblPr>
+              <a:tblGrid>
+                <a:gridCol w="1662002">
+                  <a:extLst>
+                    <a:ext uri="{9D8B030D-6E8A-4147-A177-3AD203B41FA5}">
+                      <a16:colId xmlns:a16="http://schemas.microsoft.com/office/drawing/2014/main" val="2842163565"/>
+                    </a:ext>
+                  </a:extLst>
+                </a:gridCol>
+                <a:gridCol w="1662002">
+                  <a:extLst>
+                    <a:ext uri="{9D8B030D-6E8A-4147-A177-3AD203B41FA5}">
+                      <a16:colId xmlns:a16="http://schemas.microsoft.com/office/drawing/2014/main" val="3694270964"/>
+                    </a:ext>
+                  </a:extLst>
+                </a:gridCol>
+                <a:gridCol w="1662002">
+                  <a:extLst>
+                    <a:ext uri="{9D8B030D-6E8A-4147-A177-3AD203B41FA5}">
+                      <a16:colId xmlns:a16="http://schemas.microsoft.com/office/drawing/2014/main" val="1674887324"/>
+                    </a:ext>
+                  </a:extLst>
+                </a:gridCol>
+                <a:gridCol w="1662002">
+                  <a:extLst>
+                    <a:ext uri="{9D8B030D-6E8A-4147-A177-3AD203B41FA5}">
+                      <a16:colId xmlns:a16="http://schemas.microsoft.com/office/drawing/2014/main" val="1093988425"/>
+                    </a:ext>
+                  </a:extLst>
+                </a:gridCol>
+              </a:tblGrid>
+              <a:tr h="370840">
+                <a:tc>
+                  <a:txBody>
+                    <a:bodyPr/>
+                    <a:lstStyle/>
+                    <a:p>
+                      <a:pPr algn="ctr"/>
+                      <a:r>
+                        <a:rPr lang="en-US" dirty="0"/>
+                        <a:t>Health Measure</a:t>
+                      </a:r>
+                    </a:p>
+                  </a:txBody>
+                  <a:tcPr anchor="ctr"/>
+                </a:tc>
+                <a:tc>
+                  <a:txBody>
+                    <a:bodyPr/>
+                    <a:lstStyle/>
+                    <a:p>
+                      <a:pPr algn="ctr"/>
+                      <a:r>
+                        <a:rPr lang="en-US" dirty="0"/>
+                        <a:t>Data Source</a:t>
+                      </a:r>
+                    </a:p>
+                  </a:txBody>
+                  <a:tcPr anchor="ctr"/>
+                </a:tc>
+                <a:tc>
+                  <a:txBody>
+                    <a:bodyPr/>
+                    <a:lstStyle/>
+                    <a:p>
+                      <a:pPr algn="ctr"/>
+                      <a:r>
+                        <a:rPr lang="en-US" dirty="0"/>
+                        <a:t>Meal Type</a:t>
+                      </a:r>
+                    </a:p>
+                  </a:txBody>
+                  <a:tcPr anchor="ctr"/>
+                </a:tc>
+                <a:tc>
+                  <a:txBody>
+                    <a:bodyPr/>
+                    <a:lstStyle/>
+                    <a:p>
+                      <a:pPr algn="ctr"/>
+                      <a:r>
+                        <a:rPr lang="en-US" dirty="0"/>
+                        <a:t>Cuisine</a:t>
+                      </a:r>
+                    </a:p>
+                  </a:txBody>
+                  <a:tcPr anchor="ctr"/>
+                </a:tc>
+                <a:extLst>
+                  <a:ext uri="{0D108BD9-81ED-4DB2-BD59-A6C34878D82A}">
+                    <a16:rowId xmlns:a16="http://schemas.microsoft.com/office/drawing/2014/main" val="2765508743"/>
+                  </a:ext>
+                </a:extLst>
+              </a:tr>
+              <a:tr h="1310640">
+                <a:tc rowSpan="2">
+                  <a:txBody>
+                    <a:bodyPr/>
+                    <a:lstStyle/>
+                    <a:p>
+                      <a:pPr algn="ctr"/>
+                      <a:r>
+                        <a:rPr lang="en-US" strike="sngStrike" dirty="0"/>
+                        <a:t>Nutri-Scores</a:t>
+                      </a:r>
+                    </a:p>
+                  </a:txBody>
+                  <a:tcPr anchor="ctr">
+                    <a:solidFill>
+                      <a:schemeClr val="accent1">
+                        <a:lumMod val="20000"/>
+                        <a:lumOff val="80000"/>
+                      </a:schemeClr>
+                    </a:solidFill>
+                  </a:tcPr>
+                </a:tc>
+                <a:tc rowSpan="2">
+                  <a:txBody>
+                    <a:bodyPr/>
+                    <a:lstStyle/>
+                    <a:p>
+                      <a:pPr algn="ctr"/>
+                      <a:r>
+                        <a:rPr lang="en-US" strike="sngStrike" dirty="0"/>
+                        <a:t>Spoonacular API</a:t>
+                      </a:r>
+                    </a:p>
+                  </a:txBody>
+                  <a:tcPr anchor="ctr">
+                    <a:solidFill>
+                      <a:schemeClr val="accent1">
+                        <a:lumMod val="20000"/>
+                        <a:lumOff val="80000"/>
+                      </a:schemeClr>
+                    </a:solidFill>
+                  </a:tcPr>
+                </a:tc>
+                <a:tc>
+                  <a:txBody>
+                    <a:bodyPr/>
+                    <a:lstStyle/>
+                    <a:p>
+                      <a:pPr algn="ctr"/>
+                      <a:r>
+                        <a:rPr lang="en-US" dirty="0"/>
+                        <a:t>Breakfast</a:t>
+                      </a:r>
+                    </a:p>
+                  </a:txBody>
+                  <a:tcPr anchor="ctr">
+                    <a:solidFill>
+                      <a:schemeClr val="accent1">
+                        <a:lumMod val="20000"/>
+                        <a:lumOff val="80000"/>
+                      </a:schemeClr>
+                    </a:solidFill>
+                  </a:tcPr>
+                </a:tc>
+                <a:tc rowSpan="4">
+                  <a:txBody>
+                    <a:bodyPr/>
+                    <a:lstStyle/>
+                    <a:p>
+                      <a:pPr algn="ctr"/>
+                      <a:r>
+                        <a:rPr lang="en-US" dirty="0"/>
+                        <a:t>African</a:t>
+                      </a:r>
+                    </a:p>
+                    <a:p>
+                      <a:pPr algn="ctr"/>
+                      <a:r>
+                        <a:rPr lang="en-US" dirty="0"/>
+                        <a:t>Cajun</a:t>
+                      </a:r>
+                    </a:p>
+                    <a:p>
+                      <a:pPr algn="ctr"/>
+                      <a:r>
+                        <a:rPr lang="en-US" dirty="0"/>
+                        <a:t>Caribbean</a:t>
+                      </a:r>
+                    </a:p>
+                    <a:p>
+                      <a:pPr algn="ctr"/>
+                      <a:r>
+                        <a:rPr lang="en-US" dirty="0"/>
+                        <a:t>French</a:t>
+                      </a:r>
+                    </a:p>
+                    <a:p>
+                      <a:pPr algn="ctr"/>
+                      <a:r>
+                        <a:rPr lang="en-US" dirty="0"/>
+                        <a:t>German</a:t>
+                      </a:r>
+                    </a:p>
+                    <a:p>
+                      <a:pPr algn="ctr"/>
+                      <a:r>
+                        <a:rPr lang="en-US" dirty="0"/>
+                        <a:t>Greek</a:t>
+                      </a:r>
+                    </a:p>
+                    <a:p>
+                      <a:pPr algn="ctr"/>
+                      <a:r>
+                        <a:rPr lang="en-US" dirty="0"/>
+                        <a:t>Indian</a:t>
+                      </a:r>
+                    </a:p>
+                    <a:p>
+                      <a:pPr algn="ctr"/>
+                      <a:r>
+                        <a:rPr lang="en-US" dirty="0"/>
+                        <a:t>Irish</a:t>
+                      </a:r>
+                    </a:p>
+                    <a:p>
+                      <a:pPr algn="ctr"/>
+                      <a:r>
+                        <a:rPr lang="en-US" dirty="0"/>
+                        <a:t>Japanese</a:t>
+                      </a:r>
+                    </a:p>
+                    <a:p>
+                      <a:pPr algn="ctr"/>
+                      <a:r>
+                        <a:rPr lang="en-US" dirty="0"/>
+                        <a:t>Korean</a:t>
+                      </a:r>
+                    </a:p>
+                    <a:p>
+                      <a:pPr algn="ctr"/>
+                      <a:r>
+                        <a:rPr lang="en-US" dirty="0"/>
+                        <a:t>Mexican</a:t>
+                      </a:r>
+                    </a:p>
+                    <a:p>
+                      <a:pPr algn="ctr"/>
+                      <a:r>
+                        <a:rPr lang="en-US" dirty="0"/>
+                        <a:t>Spanish</a:t>
+                      </a:r>
+                    </a:p>
+                    <a:p>
+                      <a:pPr algn="ctr"/>
+                      <a:r>
+                        <a:rPr lang="en-US" dirty="0"/>
+                        <a:t>Thai</a:t>
+                      </a:r>
+                    </a:p>
+                    <a:p>
+                      <a:pPr algn="ctr"/>
+                      <a:r>
+                        <a:rPr lang="en-US" dirty="0"/>
+                        <a:t>Vietnamese</a:t>
+                      </a:r>
+                    </a:p>
+                  </a:txBody>
+                  <a:tcPr>
+                    <a:solidFill>
+                      <a:schemeClr val="accent1">
+                        <a:lumMod val="20000"/>
+                        <a:lumOff val="80000"/>
+                      </a:schemeClr>
+                    </a:solidFill>
+                  </a:tcPr>
+                </a:tc>
+                <a:extLst>
+                  <a:ext uri="{0D108BD9-81ED-4DB2-BD59-A6C34878D82A}">
+                    <a16:rowId xmlns:a16="http://schemas.microsoft.com/office/drawing/2014/main" val="61323035"/>
+                  </a:ext>
+                </a:extLst>
+              </a:tr>
+              <a:tr h="655320">
+                <a:tc vMerge="1">
+                  <a:txBody>
+                    <a:bodyPr/>
+                    <a:lstStyle/>
+                    <a:p>
+                      <a:endParaRPr lang="en-US"/>
+                    </a:p>
+                  </a:txBody>
+                  <a:tcPr/>
+                </a:tc>
+                <a:tc vMerge="1">
+                  <a:txBody>
+                    <a:bodyPr/>
+                    <a:lstStyle/>
+                    <a:p>
+                      <a:endParaRPr lang="en-US"/>
+                    </a:p>
+                  </a:txBody>
+                  <a:tcPr/>
+                </a:tc>
+                <a:tc rowSpan="2">
+                  <a:txBody>
+                    <a:bodyPr/>
+                    <a:lstStyle/>
+                    <a:p>
+                      <a:pPr algn="ctr"/>
+                      <a:r>
+                        <a:rPr lang="en-US" dirty="0"/>
+                        <a:t>Lunch</a:t>
+                      </a:r>
+                    </a:p>
+                  </a:txBody>
+                  <a:tcPr anchor="ctr">
+                    <a:solidFill>
+                      <a:schemeClr val="accent1">
+                        <a:lumMod val="20000"/>
+                        <a:lumOff val="80000"/>
+                      </a:schemeClr>
+                    </a:solidFill>
+                  </a:tcPr>
+                </a:tc>
+                <a:tc vMerge="1">
+                  <a:txBody>
+                    <a:bodyPr/>
+                    <a:lstStyle/>
+                    <a:p>
+                      <a:endParaRPr lang="en-US"/>
+                    </a:p>
+                  </a:txBody>
+                  <a:tcPr/>
+                </a:tc>
+                <a:extLst>
+                  <a:ext uri="{0D108BD9-81ED-4DB2-BD59-A6C34878D82A}">
+                    <a16:rowId xmlns:a16="http://schemas.microsoft.com/office/drawing/2014/main" val="1918014591"/>
+                  </a:ext>
+                </a:extLst>
+              </a:tr>
+              <a:tr h="655320">
+                <a:tc rowSpan="2">
+                  <a:txBody>
+                    <a:bodyPr/>
+                    <a:lstStyle/>
+                    <a:p>
+                      <a:pPr marL="0" marR="0" lvl="0" indent="0" algn="ctr" defTabSz="457200" rtl="0" eaLnBrk="1" fontAlgn="auto" latinLnBrk="0" hangingPunct="1">
+                        <a:lnSpc>
+                          <a:spcPct val="100000"/>
+                        </a:lnSpc>
+                        <a:spcBef>
+                          <a:spcPts val="0"/>
+                        </a:spcBef>
+                        <a:spcAft>
+                          <a:spcPts val="0"/>
+                        </a:spcAft>
+                        <a:buClrTx/>
+                        <a:buSzTx/>
+                        <a:buFontTx/>
+                        <a:buNone/>
+                        <a:tabLst/>
+                        <a:defRPr/>
+                      </a:pPr>
+                      <a:r>
+                        <a:rPr lang="en-US" dirty="0"/>
+                        <a:t>Weight Watchers Smart Points</a:t>
+                      </a:r>
+                    </a:p>
+                  </a:txBody>
+                  <a:tcPr anchor="ctr">
+                    <a:solidFill>
+                      <a:schemeClr val="accent1">
+                        <a:lumMod val="20000"/>
+                        <a:lumOff val="80000"/>
+                      </a:schemeClr>
+                    </a:solidFill>
+                  </a:tcPr>
+                </a:tc>
+                <a:tc rowSpan="2">
+                  <a:txBody>
+                    <a:bodyPr/>
+                    <a:lstStyle/>
+                    <a:p>
+                      <a:pPr marL="0" marR="0" lvl="0" indent="0" algn="ctr" defTabSz="457200" rtl="0" eaLnBrk="1" fontAlgn="auto" latinLnBrk="0" hangingPunct="1">
+                        <a:lnSpc>
+                          <a:spcPct val="100000"/>
+                        </a:lnSpc>
+                        <a:spcBef>
+                          <a:spcPts val="0"/>
+                        </a:spcBef>
+                        <a:spcAft>
+                          <a:spcPts val="0"/>
+                        </a:spcAft>
+                        <a:buClrTx/>
+                        <a:buSzTx/>
+                        <a:buFontTx/>
+                        <a:buNone/>
+                        <a:tabLst/>
+                        <a:defRPr/>
+                      </a:pPr>
+                      <a:r>
+                        <a:rPr lang="en-US" dirty="0"/>
+                        <a:t>Kaggle Dataset</a:t>
+                      </a:r>
+                    </a:p>
+                  </a:txBody>
+                  <a:tcPr anchor="ctr">
+                    <a:solidFill>
+                      <a:schemeClr val="accent1">
+                        <a:lumMod val="20000"/>
+                        <a:lumOff val="80000"/>
+                      </a:schemeClr>
+                    </a:solidFill>
+                  </a:tcPr>
+                </a:tc>
+                <a:tc vMerge="1">
+                  <a:txBody>
+                    <a:bodyPr/>
+                    <a:lstStyle/>
+                    <a:p>
+                      <a:endParaRPr lang="en-US"/>
+                    </a:p>
+                  </a:txBody>
+                  <a:tcPr/>
+                </a:tc>
+                <a:tc vMerge="1">
+                  <a:txBody>
+                    <a:bodyPr/>
+                    <a:lstStyle/>
+                    <a:p>
+                      <a:endParaRPr lang="en-US"/>
+                    </a:p>
+                  </a:txBody>
+                  <a:tcPr/>
+                </a:tc>
+                <a:extLst>
+                  <a:ext uri="{0D108BD9-81ED-4DB2-BD59-A6C34878D82A}">
+                    <a16:rowId xmlns:a16="http://schemas.microsoft.com/office/drawing/2014/main" val="1874076762"/>
+                  </a:ext>
+                </a:extLst>
+              </a:tr>
+              <a:tr h="1310640">
+                <a:tc vMerge="1">
+                  <a:txBody>
+                    <a:bodyPr/>
+                    <a:lstStyle/>
+                    <a:p>
+                      <a:endParaRPr lang="en-US"/>
+                    </a:p>
+                  </a:txBody>
+                  <a:tcPr/>
+                </a:tc>
+                <a:tc vMerge="1">
+                  <a:txBody>
+                    <a:bodyPr/>
+                    <a:lstStyle/>
+                    <a:p>
+                      <a:endParaRPr lang="en-US"/>
+                    </a:p>
+                  </a:txBody>
+                  <a:tcPr/>
+                </a:tc>
+                <a:tc>
+                  <a:txBody>
+                    <a:bodyPr/>
+                    <a:lstStyle/>
+                    <a:p>
+                      <a:pPr algn="ctr"/>
+                      <a:r>
+                        <a:rPr lang="en-US" dirty="0"/>
+                        <a:t>Dinner</a:t>
+                      </a:r>
+                    </a:p>
+                  </a:txBody>
+                  <a:tcPr anchor="ctr">
+                    <a:solidFill>
+                      <a:schemeClr val="accent1">
+                        <a:lumMod val="20000"/>
+                        <a:lumOff val="80000"/>
+                      </a:schemeClr>
+                    </a:solidFill>
+                  </a:tcPr>
+                </a:tc>
+                <a:tc vMerge="1">
+                  <a:txBody>
+                    <a:bodyPr/>
+                    <a:lstStyle/>
+                    <a:p>
+                      <a:endParaRPr lang="en-US"/>
+                    </a:p>
+                  </a:txBody>
+                  <a:tcPr/>
+                </a:tc>
+                <a:extLst>
+                  <a:ext uri="{0D108BD9-81ED-4DB2-BD59-A6C34878D82A}">
+                    <a16:rowId xmlns:a16="http://schemas.microsoft.com/office/drawing/2014/main" val="692327484"/>
+                  </a:ext>
+                </a:extLst>
+              </a:tr>
+            </a:tbl>
           </a:graphicData>
         </a:graphic>
       </p:graphicFrame>
-      <p:sp>
-        <p:nvSpPr>
-          <p:cNvPr id="8" name="TextBox 7">
-            <a:extLst>
-              <a:ext uri="{FF2B5EF4-FFF2-40B4-BE49-F238E27FC236}">
-                <a16:creationId xmlns:a16="http://schemas.microsoft.com/office/drawing/2014/main" id="{0872C4FB-7BF6-83D6-8238-3ED65FB1A1AE}"/>
-              </a:ext>
-            </a:extLst>
-          </p:cNvPr>
-          <p:cNvSpPr txBox="1"/>
-          <p:nvPr/>
-        </p:nvSpPr>
-        <p:spPr>
-          <a:xfrm>
-            <a:off x="2734056" y="3916640"/>
-            <a:ext cx="1205458" cy="369332"/>
-          </a:xfrm>
-          <a:prstGeom prst="rect">
-            <a:avLst/>
-          </a:prstGeom>
-          <a:noFill/>
-        </p:spPr>
-        <p:txBody>
-          <a:bodyPr wrap="square" rtlCol="0">
-            <a:spAutoFit/>
-          </a:bodyPr>
-          <a:lstStyle/>
-          <a:p>
-            <a:r>
-              <a:rPr lang="en-US" dirty="0"/>
-              <a:t>Meal Type</a:t>
-            </a:r>
-          </a:p>
-        </p:txBody>
-      </p:sp>
     </p:spTree>
     <p:extLst>
       <p:ext uri="{BB962C8B-B14F-4D97-AF65-F5344CB8AC3E}">

</xml_diff>

<commit_message>
updated repository structure on README
</commit_message>
<xml_diff>
--- a/Slide Deck.pptx
+++ b/Slide Deck.pptx
@@ -10582,273 +10582,6 @@
   <p:clrMapOvr>
     <a:masterClrMapping/>
   </p:clrMapOvr>
-  <p:timing>
-    <p:tnLst>
-      <p:par>
-        <p:cTn id="1" dur="indefinite" restart="never" nodeType="tmRoot">
-          <p:childTnLst>
-            <p:seq concurrent="1" nextAc="seek">
-              <p:cTn id="2" dur="indefinite" nodeType="mainSeq">
-                <p:childTnLst>
-                  <p:par>
-                    <p:cTn id="3" fill="hold">
-                      <p:stCondLst>
-                        <p:cond delay="indefinite"/>
-                        <p:cond evt="onBegin" delay="0">
-                          <p:tn val="2"/>
-                        </p:cond>
-                      </p:stCondLst>
-                      <p:childTnLst>
-                        <p:par>
-                          <p:cTn id="4" fill="hold">
-                            <p:stCondLst>
-                              <p:cond delay="0"/>
-                            </p:stCondLst>
-                            <p:childTnLst>
-                              <p:par>
-                                <p:cTn id="5" presetID="10" presetClass="entr" presetSubtype="0" fill="hold" grpId="0" nodeType="withEffect">
-                                  <p:stCondLst>
-                                    <p:cond delay="1500"/>
-                                  </p:stCondLst>
-                                  <p:iterate>
-                                    <p:tmPct val="10000"/>
-                                  </p:iterate>
-                                  <p:childTnLst>
-                                    <p:set>
-                                      <p:cBhvr>
-                                        <p:cTn id="6" dur="1" fill="hold">
-                                          <p:stCondLst>
-                                            <p:cond delay="0"/>
-                                          </p:stCondLst>
-                                        </p:cTn>
-                                        <p:tgtEl>
-                                          <p:spTgt spid="3">
-                                            <p:txEl>
-                                              <p:pRg st="0" end="0"/>
-                                            </p:txEl>
-                                          </p:spTgt>
-                                        </p:tgtEl>
-                                        <p:attrNameLst>
-                                          <p:attrName>style.visibility</p:attrName>
-                                        </p:attrNameLst>
-                                      </p:cBhvr>
-                                      <p:to>
-                                        <p:strVal val="visible"/>
-                                      </p:to>
-                                    </p:set>
-                                    <p:animEffect transition="in" filter="fade">
-                                      <p:cBhvr>
-                                        <p:cTn id="7" dur="700"/>
-                                        <p:tgtEl>
-                                          <p:spTgt spid="3">
-                                            <p:txEl>
-                                              <p:pRg st="0" end="0"/>
-                                            </p:txEl>
-                                          </p:spTgt>
-                                        </p:tgtEl>
-                                      </p:cBhvr>
-                                    </p:animEffect>
-                                  </p:childTnLst>
-                                </p:cTn>
-                              </p:par>
-                            </p:childTnLst>
-                          </p:cTn>
-                        </p:par>
-                      </p:childTnLst>
-                    </p:cTn>
-                  </p:par>
-                  <p:par>
-                    <p:cTn id="8" fill="hold">
-                      <p:stCondLst>
-                        <p:cond delay="indefinite"/>
-                      </p:stCondLst>
-                      <p:childTnLst>
-                        <p:par>
-                          <p:cTn id="9" fill="hold">
-                            <p:stCondLst>
-                              <p:cond delay="0"/>
-                            </p:stCondLst>
-                            <p:childTnLst>
-                              <p:par>
-                                <p:cTn id="10" presetID="10" presetClass="entr" presetSubtype="0" fill="hold" grpId="0" nodeType="clickEffect">
-                                  <p:stCondLst>
-                                    <p:cond delay="1500"/>
-                                  </p:stCondLst>
-                                  <p:iterate>
-                                    <p:tmPct val="10000"/>
-                                  </p:iterate>
-                                  <p:childTnLst>
-                                    <p:set>
-                                      <p:cBhvr>
-                                        <p:cTn id="11" dur="1" fill="hold">
-                                          <p:stCondLst>
-                                            <p:cond delay="0"/>
-                                          </p:stCondLst>
-                                        </p:cTn>
-                                        <p:tgtEl>
-                                          <p:spTgt spid="3">
-                                            <p:txEl>
-                                              <p:pRg st="1" end="1"/>
-                                            </p:txEl>
-                                          </p:spTgt>
-                                        </p:tgtEl>
-                                        <p:attrNameLst>
-                                          <p:attrName>style.visibility</p:attrName>
-                                        </p:attrNameLst>
-                                      </p:cBhvr>
-                                      <p:to>
-                                        <p:strVal val="visible"/>
-                                      </p:to>
-                                    </p:set>
-                                    <p:animEffect transition="in" filter="fade">
-                                      <p:cBhvr>
-                                        <p:cTn id="12" dur="700"/>
-                                        <p:tgtEl>
-                                          <p:spTgt spid="3">
-                                            <p:txEl>
-                                              <p:pRg st="1" end="1"/>
-                                            </p:txEl>
-                                          </p:spTgt>
-                                        </p:tgtEl>
-                                      </p:cBhvr>
-                                    </p:animEffect>
-                                  </p:childTnLst>
-                                </p:cTn>
-                              </p:par>
-                            </p:childTnLst>
-                          </p:cTn>
-                        </p:par>
-                      </p:childTnLst>
-                    </p:cTn>
-                  </p:par>
-                  <p:par>
-                    <p:cTn id="13" fill="hold">
-                      <p:stCondLst>
-                        <p:cond delay="indefinite"/>
-                      </p:stCondLst>
-                      <p:childTnLst>
-                        <p:par>
-                          <p:cTn id="14" fill="hold">
-                            <p:stCondLst>
-                              <p:cond delay="0"/>
-                            </p:stCondLst>
-                            <p:childTnLst>
-                              <p:par>
-                                <p:cTn id="15" presetID="10" presetClass="entr" presetSubtype="0" fill="hold" grpId="0" nodeType="clickEffect">
-                                  <p:stCondLst>
-                                    <p:cond delay="1500"/>
-                                  </p:stCondLst>
-                                  <p:iterate>
-                                    <p:tmPct val="10000"/>
-                                  </p:iterate>
-                                  <p:childTnLst>
-                                    <p:set>
-                                      <p:cBhvr>
-                                        <p:cTn id="16" dur="1" fill="hold">
-                                          <p:stCondLst>
-                                            <p:cond delay="0"/>
-                                          </p:stCondLst>
-                                        </p:cTn>
-                                        <p:tgtEl>
-                                          <p:spTgt spid="3">
-                                            <p:txEl>
-                                              <p:pRg st="2" end="2"/>
-                                            </p:txEl>
-                                          </p:spTgt>
-                                        </p:tgtEl>
-                                        <p:attrNameLst>
-                                          <p:attrName>style.visibility</p:attrName>
-                                        </p:attrNameLst>
-                                      </p:cBhvr>
-                                      <p:to>
-                                        <p:strVal val="visible"/>
-                                      </p:to>
-                                    </p:set>
-                                    <p:animEffect transition="in" filter="fade">
-                                      <p:cBhvr>
-                                        <p:cTn id="17" dur="700"/>
-                                        <p:tgtEl>
-                                          <p:spTgt spid="3">
-                                            <p:txEl>
-                                              <p:pRg st="2" end="2"/>
-                                            </p:txEl>
-                                          </p:spTgt>
-                                        </p:tgtEl>
-                                      </p:cBhvr>
-                                    </p:animEffect>
-                                  </p:childTnLst>
-                                </p:cTn>
-                              </p:par>
-                              <p:par>
-                                <p:cTn id="18" presetID="10" presetClass="entr" presetSubtype="0" fill="hold" grpId="0" nodeType="withEffect">
-                                  <p:stCondLst>
-                                    <p:cond delay="1000"/>
-                                  </p:stCondLst>
-                                  <p:iterate>
-                                    <p:tmPct val="10000"/>
-                                  </p:iterate>
-                                  <p:childTnLst>
-                                    <p:set>
-                                      <p:cBhvr>
-                                        <p:cTn id="19" dur="1" fill="hold">
-                                          <p:stCondLst>
-                                            <p:cond delay="0"/>
-                                          </p:stCondLst>
-                                        </p:cTn>
-                                        <p:tgtEl>
-                                          <p:spTgt spid="2"/>
-                                        </p:tgtEl>
-                                        <p:attrNameLst>
-                                          <p:attrName>style.visibility</p:attrName>
-                                        </p:attrNameLst>
-                                      </p:cBhvr>
-                                      <p:to>
-                                        <p:strVal val="visible"/>
-                                      </p:to>
-                                    </p:set>
-                                    <p:animEffect transition="in" filter="fade">
-                                      <p:cBhvr>
-                                        <p:cTn id="20" dur="700"/>
-                                        <p:tgtEl>
-                                          <p:spTgt spid="2"/>
-                                        </p:tgtEl>
-                                      </p:cBhvr>
-                                    </p:animEffect>
-                                  </p:childTnLst>
-                                </p:cTn>
-                              </p:par>
-                            </p:childTnLst>
-                          </p:cTn>
-                        </p:par>
-                      </p:childTnLst>
-                    </p:cTn>
-                  </p:par>
-                </p:childTnLst>
-              </p:cTn>
-              <p:prevCondLst>
-                <p:cond evt="onPrev" delay="0">
-                  <p:tgtEl>
-                    <p:sldTgt/>
-                  </p:tgtEl>
-                </p:cond>
-              </p:prevCondLst>
-              <p:nextCondLst>
-                <p:cond evt="onNext" delay="0">
-                  <p:tgtEl>
-                    <p:sldTgt/>
-                  </p:tgtEl>
-                </p:cond>
-              </p:nextCondLst>
-            </p:seq>
-          </p:childTnLst>
-        </p:cTn>
-      </p:par>
-    </p:tnLst>
-    <p:bldLst>
-      <p:bldP spid="2" grpId="0"/>
-      <p:bldP spid="3" grpId="0" build="p"/>
-    </p:bldLst>
-  </p:timing>
 </p:sld>
 </file>
 
@@ -13410,14 +13143,12 @@
             </a:r>
           </a:p>
           <a:p>
-            <a:pPr lvl="1"/>
             <a:r>
               <a:rPr lang="en-US" dirty="0"/>
               <a:t>Research Questions</a:t>
             </a:r>
           </a:p>
           <a:p>
-            <a:pPr lvl="1"/>
             <a:r>
               <a:rPr lang="en-US" dirty="0"/>
               <a:t>Project Scope</a:t>

</xml_diff>

<commit_message>
finalised missing sections in README
</commit_message>
<xml_diff>
--- a/Slide Deck.pptx
+++ b/Slide Deck.pptx
@@ -121,6 +121,11 @@
       </a:defRPr>
     </a:lvl9pPr>
   </p:defaultTextStyle>
+  <p:extLst>
+    <p:ext uri="{EFAFB233-063F-42B5-8137-9DF3F51BA10A}">
+      <p15:sldGuideLst xmlns:p15="http://schemas.microsoft.com/office/powerpoint/2012/main"/>
+    </p:ext>
+  </p:extLst>
 </p:presentation>
 </file>
 
@@ -12873,6 +12878,45 @@
           </a:prstGeom>
         </p:spPr>
       </p:pic>
+      <p:sp>
+        <p:nvSpPr>
+          <p:cNvPr id="4" name="TextBox 3">
+            <a:extLst>
+              <a:ext uri="{FF2B5EF4-FFF2-40B4-BE49-F238E27FC236}">
+                <a16:creationId xmlns:a16="http://schemas.microsoft.com/office/drawing/2014/main" id="{666EB79D-2C12-9F70-3AD1-C65FA7DD9BB0}"/>
+              </a:ext>
+            </a:extLst>
+          </p:cNvPr>
+          <p:cNvSpPr txBox="1"/>
+          <p:nvPr/>
+        </p:nvSpPr>
+        <p:spPr>
+          <a:xfrm>
+            <a:off x="3211362" y="4231851"/>
+            <a:ext cx="3460372" cy="369332"/>
+          </a:xfrm>
+          <a:prstGeom prst="rect">
+            <a:avLst/>
+          </a:prstGeom>
+          <a:noFill/>
+        </p:spPr>
+        <p:txBody>
+          <a:bodyPr wrap="square">
+            <a:spAutoFit/>
+          </a:bodyPr>
+          <a:lstStyle/>
+          <a:p>
+            <a:pPr algn="ctr"/>
+            <a:r>
+              <a:rPr lang="en-US" dirty="0">
+                <a:hlinkClick r:id="rId4"/>
+              </a:rPr>
+              <a:t>Get the recipe!</a:t>
+            </a:r>
+            <a:endParaRPr lang="en-US" dirty="0"/>
+          </a:p>
+        </p:txBody>
+      </p:sp>
     </p:spTree>
     <p:extLst>
       <p:ext uri="{BB962C8B-B14F-4D97-AF65-F5344CB8AC3E}">

</xml_diff>